<commit_message>
presentación Asignación 4 V2
</commit_message>
<xml_diff>
--- a/Presentación_A4.pptx
+++ b/Presentación_A4.pptx
@@ -20,6 +20,8 @@
     <p:sldId id="265" r:id="rId14"/>
     <p:sldId id="266" r:id="rId15"/>
     <p:sldId id="267" r:id="rId16"/>
+    <p:sldId id="268" r:id="rId17"/>
+    <p:sldId id="269" r:id="rId18"/>
   </p:sldIdLst>
   <p:sldSz cy="6858000" cx="12192000"/>
   <p:notesSz cx="6858000" cy="9144000"/>
@@ -254,7 +256,7 @@
   </p:defaultTextStyle>
   <p:extLst>
     <p:ext uri="http://customooxmlschemas.google.com/">
-      <go:slidesCustomData xmlns:go="http://customooxmlschemas.google.com/" r:id="rId17" roundtripDataSignature="AMtx7mjqA1o6jkwhrzFsQv0TQZXeCd9XGA=="/>
+      <go:slidesCustomData xmlns:go="http://customooxmlschemas.google.com/" r:id="rId19" roundtripDataSignature="AMtx7miCMsxApyvzDqmQYzNLd2k2ZcpRwQ=="/>
     </p:ext>
   </p:extLst>
 </p:presentation>
@@ -943,7 +945,7 @@
   <p:cSld>
     <p:spTree>
       <p:nvGrpSpPr>
-        <p:cNvPr id="195" name="Shape 195"/>
+        <p:cNvPr id="198" name="Shape 198"/>
         <p:cNvGrpSpPr/>
         <p:nvPr/>
       </p:nvGrpSpPr>
@@ -957,7 +959,7 @@
       </p:grpSpPr>
       <p:sp>
         <p:nvSpPr>
-          <p:cNvPr id="196" name="Google Shape;196;p5:notes"/>
+          <p:cNvPr id="199" name="Google Shape;199;g104ffd182bf_0_36:notes"/>
           <p:cNvSpPr txBox="1"/>
           <p:nvPr>
             <p:ph idx="1" type="body"/>
@@ -1004,7 +1006,241 @@
       </p:sp>
       <p:sp>
         <p:nvSpPr>
-          <p:cNvPr id="197" name="Google Shape;197;p5:notes"/>
+          <p:cNvPr id="200" name="Google Shape;200;g104ffd182bf_0_36:notes"/>
+          <p:cNvSpPr/>
+          <p:nvPr>
+            <p:ph idx="2" type="sldImg"/>
+          </p:nvPr>
+        </p:nvSpPr>
+        <p:spPr>
+          <a:xfrm>
+            <a:off x="1143225" y="685800"/>
+            <a:ext cx="4572300" cy="3429000"/>
+          </a:xfrm>
+          <a:custGeom>
+            <a:rect b="b" l="l" r="r" t="t"/>
+            <a:pathLst>
+              <a:path extrusionOk="0" h="120000" w="120000">
+                <a:moveTo>
+                  <a:pt x="0" y="0"/>
+                </a:moveTo>
+                <a:lnTo>
+                  <a:pt x="120000" y="0"/>
+                </a:lnTo>
+                <a:lnTo>
+                  <a:pt x="120000" y="120000"/>
+                </a:lnTo>
+                <a:lnTo>
+                  <a:pt x="0" y="120000"/>
+                </a:lnTo>
+                <a:close/>
+              </a:path>
+            </a:pathLst>
+          </a:custGeom>
+          <a:noFill/>
+          <a:ln cap="flat" cmpd="sng" w="9525">
+            <a:solidFill>
+              <a:srgbClr val="000000"/>
+            </a:solidFill>
+            <a:prstDash val="solid"/>
+            <a:round/>
+            <a:headEnd len="sm" w="sm" type="none"/>
+            <a:tailEnd len="sm" w="sm" type="none"/>
+          </a:ln>
+        </p:spPr>
+      </p:sp>
+    </p:spTree>
+  </p:cSld>
+  <p:clrMapOvr>
+    <a:masterClrMapping/>
+  </p:clrMapOvr>
+</p:notes>
+</file>
+
+<file path=ppt/notesSlides/notesSlide11.xml><?xml version="1.0" encoding="utf-8"?>
+<p:notes xmlns:a="http://schemas.openxmlformats.org/drawingml/2006/main" xmlns:r="http://schemas.openxmlformats.org/officeDocument/2006/relationships" xmlns:mc="http://schemas.openxmlformats.org/markup-compatibility/2006" xmlns:mv="urn:schemas-microsoft-com:mac:vml" xmlns:p="http://schemas.openxmlformats.org/presentationml/2006/main" xmlns:c="http://schemas.openxmlformats.org/drawingml/2006/chart" xmlns:dgm="http://schemas.openxmlformats.org/drawingml/2006/diagram" xmlns:o="urn:schemas-microsoft-com:office:office" xmlns:v="urn:schemas-microsoft-com:vml" xmlns:pvml="urn:schemas-microsoft-com:office:powerpoint" xmlns:com="http://schemas.openxmlformats.org/drawingml/2006/compatibility" xmlns:p14="http://schemas.microsoft.com/office/powerpoint/2010/main" xmlns:p15="http://schemas.microsoft.com/office/powerpoint/2012/main" xmlns:ahyp="http://schemas.microsoft.com/office/drawing/2018/hyperlinkcolor" showMasterPhAnim="0" showMasterSp="0">
+  <p:cSld>
+    <p:spTree>
+      <p:nvGrpSpPr>
+        <p:cNvPr id="208" name="Shape 208"/>
+        <p:cNvGrpSpPr/>
+        <p:nvPr/>
+      </p:nvGrpSpPr>
+      <p:grpSpPr>
+        <a:xfrm>
+          <a:off x="0" y="0"/>
+          <a:ext cx="0" cy="0"/>
+          <a:chOff x="0" y="0"/>
+          <a:chExt cx="0" cy="0"/>
+        </a:xfrm>
+      </p:grpSpPr>
+      <p:sp>
+        <p:nvSpPr>
+          <p:cNvPr id="209" name="Google Shape;209;g104ffd182bf_0_43:notes"/>
+          <p:cNvSpPr txBox="1"/>
+          <p:nvPr>
+            <p:ph idx="1" type="body"/>
+          </p:nvPr>
+        </p:nvSpPr>
+        <p:spPr>
+          <a:xfrm>
+            <a:off x="685800" y="4343400"/>
+            <a:ext cx="5486400" cy="4114800"/>
+          </a:xfrm>
+          <a:prstGeom prst="rect">
+            <a:avLst/>
+          </a:prstGeom>
+          <a:noFill/>
+          <a:ln>
+            <a:noFill/>
+          </a:ln>
+        </p:spPr>
+        <p:txBody>
+          <a:bodyPr anchorCtr="0" anchor="t" bIns="91425" lIns="91425" spcFirstLastPara="1" rIns="91425" wrap="square" tIns="91425">
+            <a:noAutofit/>
+          </a:bodyPr>
+          <a:lstStyle/>
+          <a:p>
+            <a:pPr indent="0" lvl="0" marL="0" rtl="0" algn="l">
+              <a:lnSpc>
+                <a:spcPct val="100000"/>
+              </a:lnSpc>
+              <a:spcBef>
+                <a:spcPts val="0"/>
+              </a:spcBef>
+              <a:spcAft>
+                <a:spcPts val="0"/>
+              </a:spcAft>
+              <a:buSzPts val="1100"/>
+              <a:buNone/>
+            </a:pPr>
+            <a:r>
+              <a:t/>
+            </a:r>
+            <a:endParaRPr/>
+          </a:p>
+        </p:txBody>
+      </p:sp>
+      <p:sp>
+        <p:nvSpPr>
+          <p:cNvPr id="210" name="Google Shape;210;g104ffd182bf_0_43:notes"/>
+          <p:cNvSpPr/>
+          <p:nvPr>
+            <p:ph idx="2" type="sldImg"/>
+          </p:nvPr>
+        </p:nvSpPr>
+        <p:spPr>
+          <a:xfrm>
+            <a:off x="1143225" y="685800"/>
+            <a:ext cx="4572300" cy="3429000"/>
+          </a:xfrm>
+          <a:custGeom>
+            <a:rect b="b" l="l" r="r" t="t"/>
+            <a:pathLst>
+              <a:path extrusionOk="0" h="120000" w="120000">
+                <a:moveTo>
+                  <a:pt x="0" y="0"/>
+                </a:moveTo>
+                <a:lnTo>
+                  <a:pt x="120000" y="0"/>
+                </a:lnTo>
+                <a:lnTo>
+                  <a:pt x="120000" y="120000"/>
+                </a:lnTo>
+                <a:lnTo>
+                  <a:pt x="0" y="120000"/>
+                </a:lnTo>
+                <a:close/>
+              </a:path>
+            </a:pathLst>
+          </a:custGeom>
+          <a:noFill/>
+          <a:ln cap="flat" cmpd="sng" w="9525">
+            <a:solidFill>
+              <a:srgbClr val="000000"/>
+            </a:solidFill>
+            <a:prstDash val="solid"/>
+            <a:round/>
+            <a:headEnd len="sm" w="sm" type="none"/>
+            <a:tailEnd len="sm" w="sm" type="none"/>
+          </a:ln>
+        </p:spPr>
+      </p:sp>
+    </p:spTree>
+  </p:cSld>
+  <p:clrMapOvr>
+    <a:masterClrMapping/>
+  </p:clrMapOvr>
+</p:notes>
+</file>
+
+<file path=ppt/notesSlides/notesSlide12.xml><?xml version="1.0" encoding="utf-8"?>
+<p:notes xmlns:a="http://schemas.openxmlformats.org/drawingml/2006/main" xmlns:r="http://schemas.openxmlformats.org/officeDocument/2006/relationships" xmlns:mc="http://schemas.openxmlformats.org/markup-compatibility/2006" xmlns:mv="urn:schemas-microsoft-com:mac:vml" xmlns:p="http://schemas.openxmlformats.org/presentationml/2006/main" xmlns:c="http://schemas.openxmlformats.org/drawingml/2006/chart" xmlns:dgm="http://schemas.openxmlformats.org/drawingml/2006/diagram" xmlns:o="urn:schemas-microsoft-com:office:office" xmlns:v="urn:schemas-microsoft-com:vml" xmlns:pvml="urn:schemas-microsoft-com:office:powerpoint" xmlns:com="http://schemas.openxmlformats.org/drawingml/2006/compatibility" xmlns:p14="http://schemas.microsoft.com/office/powerpoint/2010/main" xmlns:p15="http://schemas.microsoft.com/office/powerpoint/2012/main" xmlns:ahyp="http://schemas.microsoft.com/office/drawing/2018/hyperlinkcolor" showMasterPhAnim="0" showMasterSp="0">
+  <p:cSld>
+    <p:spTree>
+      <p:nvGrpSpPr>
+        <p:cNvPr id="218" name="Shape 218"/>
+        <p:cNvGrpSpPr/>
+        <p:nvPr/>
+      </p:nvGrpSpPr>
+      <p:grpSpPr>
+        <a:xfrm>
+          <a:off x="0" y="0"/>
+          <a:ext cx="0" cy="0"/>
+          <a:chOff x="0" y="0"/>
+          <a:chExt cx="0" cy="0"/>
+        </a:xfrm>
+      </p:grpSpPr>
+      <p:sp>
+        <p:nvSpPr>
+          <p:cNvPr id="219" name="Google Shape;219;p5:notes"/>
+          <p:cNvSpPr txBox="1"/>
+          <p:nvPr>
+            <p:ph idx="1" type="body"/>
+          </p:nvPr>
+        </p:nvSpPr>
+        <p:spPr>
+          <a:xfrm>
+            <a:off x="685800" y="4343400"/>
+            <a:ext cx="5486400" cy="4114800"/>
+          </a:xfrm>
+          <a:prstGeom prst="rect">
+            <a:avLst/>
+          </a:prstGeom>
+          <a:noFill/>
+          <a:ln>
+            <a:noFill/>
+          </a:ln>
+        </p:spPr>
+        <p:txBody>
+          <a:bodyPr anchorCtr="0" anchor="t" bIns="91425" lIns="91425" spcFirstLastPara="1" rIns="91425" wrap="square" tIns="91425">
+            <a:noAutofit/>
+          </a:bodyPr>
+          <a:lstStyle/>
+          <a:p>
+            <a:pPr indent="0" lvl="0" marL="0" rtl="0" algn="l">
+              <a:lnSpc>
+                <a:spcPct val="100000"/>
+              </a:lnSpc>
+              <a:spcBef>
+                <a:spcPts val="0"/>
+              </a:spcBef>
+              <a:spcAft>
+                <a:spcPts val="0"/>
+              </a:spcAft>
+              <a:buSzPts val="1100"/>
+              <a:buNone/>
+            </a:pPr>
+            <a:r>
+              <a:t/>
+            </a:r>
+            <a:endParaRPr/>
+          </a:p>
+        </p:txBody>
+      </p:sp>
+      <p:sp>
+        <p:nvSpPr>
+          <p:cNvPr id="220" name="Google Shape;220;p5:notes"/>
           <p:cNvSpPr/>
           <p:nvPr>
             <p:ph idx="2" type="sldImg"/>
@@ -1055,12 +1291,12 @@
 </p:notes>
 </file>
 
-<file path=ppt/notesSlides/notesSlide11.xml><?xml version="1.0" encoding="utf-8"?>
+<file path=ppt/notesSlides/notesSlide13.xml><?xml version="1.0" encoding="utf-8"?>
 <p:notes xmlns:a="http://schemas.openxmlformats.org/drawingml/2006/main" xmlns:r="http://schemas.openxmlformats.org/officeDocument/2006/relationships" xmlns:mc="http://schemas.openxmlformats.org/markup-compatibility/2006" xmlns:mv="urn:schemas-microsoft-com:mac:vml" xmlns:p="http://schemas.openxmlformats.org/presentationml/2006/main" xmlns:c="http://schemas.openxmlformats.org/drawingml/2006/chart" xmlns:dgm="http://schemas.openxmlformats.org/drawingml/2006/diagram" xmlns:o="urn:schemas-microsoft-com:office:office" xmlns:v="urn:schemas-microsoft-com:vml" xmlns:pvml="urn:schemas-microsoft-com:office:powerpoint" xmlns:com="http://schemas.openxmlformats.org/drawingml/2006/compatibility" xmlns:p14="http://schemas.microsoft.com/office/powerpoint/2010/main" xmlns:p15="http://schemas.microsoft.com/office/powerpoint/2012/main" xmlns:ahyp="http://schemas.microsoft.com/office/drawing/2018/hyperlinkcolor" showMasterPhAnim="0" showMasterSp="0">
   <p:cSld>
     <p:spTree>
       <p:nvGrpSpPr>
-        <p:cNvPr id="201" name="Shape 201"/>
+        <p:cNvPr id="224" name="Shape 224"/>
         <p:cNvGrpSpPr/>
         <p:nvPr/>
       </p:nvGrpSpPr>
@@ -1074,7 +1310,7 @@
       </p:grpSpPr>
       <p:sp>
         <p:nvSpPr>
-          <p:cNvPr id="202" name="Google Shape;202;p6:notes"/>
+          <p:cNvPr id="225" name="Google Shape;225;p6:notes"/>
           <p:cNvSpPr txBox="1"/>
           <p:nvPr>
             <p:ph idx="1" type="body"/>
@@ -1121,7 +1357,7 @@
       </p:sp>
       <p:sp>
         <p:nvSpPr>
-          <p:cNvPr id="203" name="Google Shape;203;p6:notes"/>
+          <p:cNvPr id="226" name="Google Shape;226;p6:notes"/>
           <p:cNvSpPr/>
           <p:nvPr>
             <p:ph idx="2" type="sldImg"/>
@@ -1172,12 +1408,12 @@
 </p:notes>
 </file>
 
-<file path=ppt/notesSlides/notesSlide12.xml><?xml version="1.0" encoding="utf-8"?>
+<file path=ppt/notesSlides/notesSlide14.xml><?xml version="1.0" encoding="utf-8"?>
 <p:notes xmlns:a="http://schemas.openxmlformats.org/drawingml/2006/main" xmlns:r="http://schemas.openxmlformats.org/officeDocument/2006/relationships" xmlns:mc="http://schemas.openxmlformats.org/markup-compatibility/2006" xmlns:mv="urn:schemas-microsoft-com:mac:vml" xmlns:p="http://schemas.openxmlformats.org/presentationml/2006/main" xmlns:c="http://schemas.openxmlformats.org/drawingml/2006/chart" xmlns:dgm="http://schemas.openxmlformats.org/drawingml/2006/diagram" xmlns:o="urn:schemas-microsoft-com:office:office" xmlns:v="urn:schemas-microsoft-com:vml" xmlns:pvml="urn:schemas-microsoft-com:office:powerpoint" xmlns:com="http://schemas.openxmlformats.org/drawingml/2006/compatibility" xmlns:p14="http://schemas.microsoft.com/office/powerpoint/2010/main" xmlns:p15="http://schemas.microsoft.com/office/powerpoint/2012/main" xmlns:ahyp="http://schemas.microsoft.com/office/drawing/2018/hyperlinkcolor" showMasterPhAnim="0" showMasterSp="0">
   <p:cSld>
     <p:spTree>
       <p:nvGrpSpPr>
-        <p:cNvPr id="207" name="Shape 207"/>
+        <p:cNvPr id="230" name="Shape 230"/>
         <p:cNvGrpSpPr/>
         <p:nvPr/>
       </p:nvGrpSpPr>
@@ -1191,7 +1427,7 @@
       </p:grpSpPr>
       <p:sp>
         <p:nvSpPr>
-          <p:cNvPr id="208" name="Google Shape;208;p7:notes"/>
+          <p:cNvPr id="231" name="Google Shape;231;p7:notes"/>
           <p:cNvSpPr txBox="1"/>
           <p:nvPr>
             <p:ph idx="1" type="body"/>
@@ -1238,7 +1474,7 @@
       </p:sp>
       <p:sp>
         <p:nvSpPr>
-          <p:cNvPr id="209" name="Google Shape;209;p7:notes"/>
+          <p:cNvPr id="232" name="Google Shape;232;p7:notes"/>
           <p:cNvSpPr/>
           <p:nvPr>
             <p:ph idx="2" type="sldImg"/>
@@ -1659,7 +1895,7 @@
       </p:grpSpPr>
       <p:sp>
         <p:nvSpPr>
-          <p:cNvPr id="148" name="Google Shape;148;gf8306ab00d_0_22:notes"/>
+          <p:cNvPr id="148" name="Google Shape;148;gcfb26b7588_0_0:notes"/>
           <p:cNvSpPr txBox="1"/>
           <p:nvPr>
             <p:ph idx="1" type="body"/>
@@ -1706,7 +1942,7 @@
       </p:sp>
       <p:sp>
         <p:nvSpPr>
-          <p:cNvPr id="149" name="Google Shape;149;gf8306ab00d_0_22:notes"/>
+          <p:cNvPr id="149" name="Google Shape;149;gcfb26b7588_0_0:notes"/>
           <p:cNvSpPr/>
           <p:nvPr>
             <p:ph idx="2" type="sldImg"/>
@@ -1762,7 +1998,7 @@
   <p:cSld>
     <p:spTree>
       <p:nvGrpSpPr>
-        <p:cNvPr id="155" name="Shape 155"/>
+        <p:cNvPr id="157" name="Shape 157"/>
         <p:cNvGrpSpPr/>
         <p:nvPr/>
       </p:nvGrpSpPr>
@@ -1776,7 +2012,7 @@
       </p:grpSpPr>
       <p:sp>
         <p:nvSpPr>
-          <p:cNvPr id="156" name="Google Shape;156;g104ffd182bf_0_16:notes"/>
+          <p:cNvPr id="158" name="Google Shape;158;gcfb26b7588_0_15:notes"/>
           <p:cNvSpPr txBox="1"/>
           <p:nvPr>
             <p:ph idx="1" type="body"/>
@@ -1823,7 +2059,7 @@
       </p:sp>
       <p:sp>
         <p:nvSpPr>
-          <p:cNvPr id="157" name="Google Shape;157;g104ffd182bf_0_16:notes"/>
+          <p:cNvPr id="159" name="Google Shape;159;gcfb26b7588_0_15:notes"/>
           <p:cNvSpPr/>
           <p:nvPr>
             <p:ph idx="2" type="sldImg"/>
@@ -1879,7 +2115,7 @@
   <p:cSld>
     <p:spTree>
       <p:nvGrpSpPr>
-        <p:cNvPr id="165" name="Shape 165"/>
+        <p:cNvPr id="168" name="Shape 168"/>
         <p:cNvGrpSpPr/>
         <p:nvPr/>
       </p:nvGrpSpPr>
@@ -1893,7 +2129,7 @@
       </p:grpSpPr>
       <p:sp>
         <p:nvSpPr>
-          <p:cNvPr id="166" name="Google Shape;166;g104ffd182bf_0_27:notes"/>
+          <p:cNvPr id="169" name="Google Shape;169;gf8306ab00d_0_22:notes"/>
           <p:cNvSpPr txBox="1"/>
           <p:nvPr>
             <p:ph idx="1" type="body"/>
@@ -1940,7 +2176,7 @@
       </p:sp>
       <p:sp>
         <p:nvSpPr>
-          <p:cNvPr id="167" name="Google Shape;167;g104ffd182bf_0_27:notes"/>
+          <p:cNvPr id="170" name="Google Shape;170;gf8306ab00d_0_22:notes"/>
           <p:cNvSpPr/>
           <p:nvPr>
             <p:ph idx="2" type="sldImg"/>
@@ -1996,7 +2232,7 @@
   <p:cSld>
     <p:spTree>
       <p:nvGrpSpPr>
-        <p:cNvPr id="175" name="Shape 175"/>
+        <p:cNvPr id="178" name="Shape 178"/>
         <p:cNvGrpSpPr/>
         <p:nvPr/>
       </p:nvGrpSpPr>
@@ -2010,7 +2246,7 @@
       </p:grpSpPr>
       <p:sp>
         <p:nvSpPr>
-          <p:cNvPr id="176" name="Google Shape;176;g104ffd182bf_0_36:notes"/>
+          <p:cNvPr id="179" name="Google Shape;179;g104ffd182bf_0_16:notes"/>
           <p:cNvSpPr txBox="1"/>
           <p:nvPr>
             <p:ph idx="1" type="body"/>
@@ -2057,7 +2293,7 @@
       </p:sp>
       <p:sp>
         <p:nvSpPr>
-          <p:cNvPr id="177" name="Google Shape;177;g104ffd182bf_0_36:notes"/>
+          <p:cNvPr id="180" name="Google Shape;180;g104ffd182bf_0_16:notes"/>
           <p:cNvSpPr/>
           <p:nvPr>
             <p:ph idx="2" type="sldImg"/>
@@ -2113,7 +2349,7 @@
   <p:cSld>
     <p:spTree>
       <p:nvGrpSpPr>
-        <p:cNvPr id="185" name="Shape 185"/>
+        <p:cNvPr id="188" name="Shape 188"/>
         <p:cNvGrpSpPr/>
         <p:nvPr/>
       </p:nvGrpSpPr>
@@ -2127,7 +2363,7 @@
       </p:grpSpPr>
       <p:sp>
         <p:nvSpPr>
-          <p:cNvPr id="186" name="Google Shape;186;g104ffd182bf_0_43:notes"/>
+          <p:cNvPr id="189" name="Google Shape;189;g104ffd182bf_0_27:notes"/>
           <p:cNvSpPr txBox="1"/>
           <p:nvPr>
             <p:ph idx="1" type="body"/>
@@ -2174,7 +2410,7 @@
       </p:sp>
       <p:sp>
         <p:nvSpPr>
-          <p:cNvPr id="187" name="Google Shape;187;g104ffd182bf_0_43:notes"/>
+          <p:cNvPr id="190" name="Google Shape;190;g104ffd182bf_0_27:notes"/>
           <p:cNvSpPr/>
           <p:nvPr>
             <p:ph idx="2" type="sldImg"/>
@@ -16041,7 +16277,7 @@
   <p:cSld>
     <p:spTree>
       <p:nvGrpSpPr>
-        <p:cNvPr id="198" name="Shape 198"/>
+        <p:cNvPr id="201" name="Shape 201"/>
         <p:cNvGrpSpPr/>
         <p:nvPr/>
       </p:nvGrpSpPr>
@@ -16055,7 +16291,639 @@
       </p:grpSpPr>
       <p:sp>
         <p:nvSpPr>
-          <p:cNvPr id="199" name="Google Shape;199;p5"/>
+          <p:cNvPr id="202" name="Google Shape;202;g104ffd182bf_0_36"/>
+          <p:cNvSpPr txBox="1"/>
+          <p:nvPr>
+            <p:ph type="title"/>
+          </p:nvPr>
+        </p:nvSpPr>
+        <p:spPr>
+          <a:xfrm>
+            <a:off x="1066798" y="7"/>
+            <a:ext cx="10058400" cy="1056000"/>
+          </a:xfrm>
+          <a:prstGeom prst="rect">
+            <a:avLst/>
+          </a:prstGeom>
+          <a:noFill/>
+          <a:ln>
+            <a:noFill/>
+          </a:ln>
+        </p:spPr>
+        <p:txBody>
+          <a:bodyPr anchorCtr="0" anchor="ctr" bIns="45700" lIns="91425" spcFirstLastPara="1" rIns="91425" wrap="square" tIns="45700">
+            <a:normAutofit/>
+          </a:bodyPr>
+          <a:lstStyle/>
+          <a:p>
+            <a:pPr indent="0" lvl="0" marL="0" rtl="0" algn="ctr">
+              <a:lnSpc>
+                <a:spcPct val="90000"/>
+              </a:lnSpc>
+              <a:spcBef>
+                <a:spcPts val="0"/>
+              </a:spcBef>
+              <a:spcAft>
+                <a:spcPts val="0"/>
+              </a:spcAft>
+              <a:buSzPts val="5400"/>
+              <a:buFont typeface="Rockwell"/>
+              <a:buNone/>
+            </a:pPr>
+            <a:r>
+              <a:rPr lang="es-CO"/>
+              <a:t>RESULTADOS</a:t>
+            </a:r>
+            <a:endParaRPr/>
+          </a:p>
+        </p:txBody>
+      </p:sp>
+      <p:sp>
+        <p:nvSpPr>
+          <p:cNvPr id="203" name="Google Shape;203;g104ffd182bf_0_36"/>
+          <p:cNvSpPr txBox="1"/>
+          <p:nvPr/>
+        </p:nvSpPr>
+        <p:spPr>
+          <a:xfrm>
+            <a:off x="1199250" y="1056000"/>
+            <a:ext cx="9793500" cy="492600"/>
+          </a:xfrm>
+          <a:prstGeom prst="rect">
+            <a:avLst/>
+          </a:prstGeom>
+          <a:noFill/>
+          <a:ln>
+            <a:noFill/>
+          </a:ln>
+        </p:spPr>
+        <p:txBody>
+          <a:bodyPr anchorCtr="0" anchor="t" bIns="91425" lIns="91425" spcFirstLastPara="1" rIns="91425" wrap="square" tIns="91425">
+            <a:spAutoFit/>
+          </a:bodyPr>
+          <a:lstStyle/>
+          <a:p>
+            <a:pPr indent="0" lvl="0" marL="0" rtl="0" algn="ctr">
+              <a:spcBef>
+                <a:spcPts val="0"/>
+              </a:spcBef>
+              <a:spcAft>
+                <a:spcPts val="0"/>
+              </a:spcAft>
+              <a:buNone/>
+            </a:pPr>
+            <a:r>
+              <a:rPr lang="es-CO" sz="2000">
+                <a:latin typeface="Rockwell"/>
+                <a:ea typeface="Rockwell"/>
+                <a:cs typeface="Rockwell"/>
+                <a:sym typeface="Rockwell"/>
+              </a:rPr>
+              <a:t>Análisis de sensibilidad parámetro η  [0.2, 0.5 0.8 1.1 1.4].</a:t>
+            </a:r>
+            <a:endParaRPr sz="2000">
+              <a:latin typeface="Rockwell"/>
+              <a:ea typeface="Rockwell"/>
+              <a:cs typeface="Rockwell"/>
+              <a:sym typeface="Rockwell"/>
+            </a:endParaRPr>
+          </a:p>
+        </p:txBody>
+      </p:sp>
+      <p:sp>
+        <p:nvSpPr>
+          <p:cNvPr id="204" name="Google Shape;204;g104ffd182bf_0_36"/>
+          <p:cNvSpPr txBox="1"/>
+          <p:nvPr/>
+        </p:nvSpPr>
+        <p:spPr>
+          <a:xfrm>
+            <a:off x="872350" y="1752025"/>
+            <a:ext cx="4251000" cy="400200"/>
+          </a:xfrm>
+          <a:prstGeom prst="rect">
+            <a:avLst/>
+          </a:prstGeom>
+          <a:noFill/>
+          <a:ln cap="flat" cmpd="sng" w="9525">
+            <a:solidFill>
+              <a:srgbClr val="FF0000"/>
+            </a:solidFill>
+            <a:prstDash val="solid"/>
+            <a:round/>
+            <a:headEnd len="sm" w="sm" type="none"/>
+            <a:tailEnd len="sm" w="sm" type="none"/>
+          </a:ln>
+        </p:spPr>
+        <p:txBody>
+          <a:bodyPr anchorCtr="0" anchor="t" bIns="91425" lIns="91425" spcFirstLastPara="1" rIns="91425" wrap="square" tIns="91425">
+            <a:spAutoFit/>
+          </a:bodyPr>
+          <a:lstStyle/>
+          <a:p>
+            <a:pPr indent="0" lvl="0" marL="0" rtl="0" algn="ctr">
+              <a:spcBef>
+                <a:spcPts val="0"/>
+              </a:spcBef>
+              <a:spcAft>
+                <a:spcPts val="0"/>
+              </a:spcAft>
+              <a:buNone/>
+            </a:pPr>
+            <a:r>
+              <a:rPr lang="es-CO">
+                <a:solidFill>
+                  <a:srgbClr val="FF0000"/>
+                </a:solidFill>
+                <a:latin typeface="Rockwell"/>
+                <a:ea typeface="Rockwell"/>
+                <a:cs typeface="Rockwell"/>
+                <a:sym typeface="Rockwell"/>
+              </a:rPr>
+              <a:t>Modelo Newtoniano</a:t>
+            </a:r>
+            <a:r>
+              <a:rPr lang="es-CO">
+                <a:latin typeface="Rockwell"/>
+                <a:ea typeface="Rockwell"/>
+                <a:cs typeface="Rockwell"/>
+                <a:sym typeface="Rockwell"/>
+              </a:rPr>
+              <a:t> </a:t>
+            </a:r>
+            <a:endParaRPr>
+              <a:latin typeface="Rockwell"/>
+              <a:ea typeface="Rockwell"/>
+              <a:cs typeface="Rockwell"/>
+              <a:sym typeface="Rockwell"/>
+            </a:endParaRPr>
+          </a:p>
+        </p:txBody>
+      </p:sp>
+      <p:sp>
+        <p:nvSpPr>
+          <p:cNvPr id="205" name="Google Shape;205;g104ffd182bf_0_36"/>
+          <p:cNvSpPr txBox="1"/>
+          <p:nvPr/>
+        </p:nvSpPr>
+        <p:spPr>
+          <a:xfrm>
+            <a:off x="7068650" y="1752125"/>
+            <a:ext cx="4251000" cy="400200"/>
+          </a:xfrm>
+          <a:prstGeom prst="rect">
+            <a:avLst/>
+          </a:prstGeom>
+          <a:noFill/>
+          <a:ln cap="flat" cmpd="sng" w="9525">
+            <a:solidFill>
+              <a:srgbClr val="0000FF"/>
+            </a:solidFill>
+            <a:prstDash val="solid"/>
+            <a:round/>
+            <a:headEnd len="sm" w="sm" type="none"/>
+            <a:tailEnd len="sm" w="sm" type="none"/>
+          </a:ln>
+        </p:spPr>
+        <p:txBody>
+          <a:bodyPr anchorCtr="0" anchor="t" bIns="91425" lIns="91425" spcFirstLastPara="1" rIns="91425" wrap="square" tIns="91425">
+            <a:spAutoFit/>
+          </a:bodyPr>
+          <a:lstStyle/>
+          <a:p>
+            <a:pPr indent="0" lvl="0" marL="0" rtl="0" algn="ctr">
+              <a:spcBef>
+                <a:spcPts val="0"/>
+              </a:spcBef>
+              <a:spcAft>
+                <a:spcPts val="0"/>
+              </a:spcAft>
+              <a:buNone/>
+            </a:pPr>
+            <a:r>
+              <a:rPr lang="es-CO">
+                <a:solidFill>
+                  <a:srgbClr val="0000FF"/>
+                </a:solidFill>
+                <a:latin typeface="Rockwell"/>
+                <a:ea typeface="Rockwell"/>
+                <a:cs typeface="Rockwell"/>
+                <a:sym typeface="Rockwell"/>
+              </a:rPr>
+              <a:t>Modelo Relativista </a:t>
+            </a:r>
+            <a:endParaRPr>
+              <a:solidFill>
+                <a:srgbClr val="0000FF"/>
+              </a:solidFill>
+              <a:latin typeface="Rockwell"/>
+              <a:ea typeface="Rockwell"/>
+              <a:cs typeface="Rockwell"/>
+              <a:sym typeface="Rockwell"/>
+            </a:endParaRPr>
+          </a:p>
+        </p:txBody>
+      </p:sp>
+      <p:pic>
+        <p:nvPicPr>
+          <p:cNvPr id="206" name="Google Shape;206;g104ffd182bf_0_36"/>
+          <p:cNvPicPr preferRelativeResize="0"/>
+          <p:nvPr/>
+        </p:nvPicPr>
+        <p:blipFill>
+          <a:blip r:embed="rId3">
+            <a:alphaModFix/>
+          </a:blip>
+          <a:stretch>
+            <a:fillRect/>
+          </a:stretch>
+        </p:blipFill>
+        <p:spPr>
+          <a:xfrm>
+            <a:off x="98975" y="2462600"/>
+            <a:ext cx="5797750" cy="3350124"/>
+          </a:xfrm>
+          <a:prstGeom prst="rect">
+            <a:avLst/>
+          </a:prstGeom>
+          <a:noFill/>
+          <a:ln>
+            <a:noFill/>
+          </a:ln>
+        </p:spPr>
+      </p:pic>
+      <p:pic>
+        <p:nvPicPr>
+          <p:cNvPr id="207" name="Google Shape;207;g104ffd182bf_0_36"/>
+          <p:cNvPicPr preferRelativeResize="0"/>
+          <p:nvPr/>
+        </p:nvPicPr>
+        <p:blipFill>
+          <a:blip r:embed="rId4">
+            <a:alphaModFix/>
+          </a:blip>
+          <a:stretch>
+            <a:fillRect/>
+          </a:stretch>
+        </p:blipFill>
+        <p:spPr>
+          <a:xfrm>
+            <a:off x="6078078" y="2355850"/>
+            <a:ext cx="6113921" cy="3437850"/>
+          </a:xfrm>
+          <a:prstGeom prst="rect">
+            <a:avLst/>
+          </a:prstGeom>
+          <a:noFill/>
+          <a:ln>
+            <a:noFill/>
+          </a:ln>
+        </p:spPr>
+      </p:pic>
+    </p:spTree>
+  </p:cSld>
+  <p:clrMapOvr>
+    <a:masterClrMapping/>
+  </p:clrMapOvr>
+</p:sld>
+</file>
+
+<file path=ppt/slides/slide11.xml><?xml version="1.0" encoding="utf-8"?>
+<p:sld xmlns:a="http://schemas.openxmlformats.org/drawingml/2006/main" xmlns:r="http://schemas.openxmlformats.org/officeDocument/2006/relationships" xmlns:mc="http://schemas.openxmlformats.org/markup-compatibility/2006" xmlns:mv="urn:schemas-microsoft-com:mac:vml" xmlns:p="http://schemas.openxmlformats.org/presentationml/2006/main" xmlns:c="http://schemas.openxmlformats.org/drawingml/2006/chart" xmlns:dgm="http://schemas.openxmlformats.org/drawingml/2006/diagram" xmlns:o="urn:schemas-microsoft-com:office:office" xmlns:v="urn:schemas-microsoft-com:vml" xmlns:pvml="urn:schemas-microsoft-com:office:powerpoint" xmlns:com="http://schemas.openxmlformats.org/drawingml/2006/compatibility" xmlns:p14="http://schemas.microsoft.com/office/powerpoint/2010/main" xmlns:p15="http://schemas.microsoft.com/office/powerpoint/2012/main" xmlns:ahyp="http://schemas.microsoft.com/office/drawing/2018/hyperlinkcolor">
+  <p:cSld>
+    <p:spTree>
+      <p:nvGrpSpPr>
+        <p:cNvPr id="211" name="Shape 211"/>
+        <p:cNvGrpSpPr/>
+        <p:nvPr/>
+      </p:nvGrpSpPr>
+      <p:grpSpPr>
+        <a:xfrm>
+          <a:off x="0" y="0"/>
+          <a:ext cx="0" cy="0"/>
+          <a:chOff x="0" y="0"/>
+          <a:chExt cx="0" cy="0"/>
+        </a:xfrm>
+      </p:grpSpPr>
+      <p:sp>
+        <p:nvSpPr>
+          <p:cNvPr id="212" name="Google Shape;212;g104ffd182bf_0_43"/>
+          <p:cNvSpPr txBox="1"/>
+          <p:nvPr>
+            <p:ph type="title"/>
+          </p:nvPr>
+        </p:nvSpPr>
+        <p:spPr>
+          <a:xfrm>
+            <a:off x="1066798" y="7"/>
+            <a:ext cx="10058400" cy="1056000"/>
+          </a:xfrm>
+          <a:prstGeom prst="rect">
+            <a:avLst/>
+          </a:prstGeom>
+          <a:noFill/>
+          <a:ln>
+            <a:noFill/>
+          </a:ln>
+        </p:spPr>
+        <p:txBody>
+          <a:bodyPr anchorCtr="0" anchor="ctr" bIns="45700" lIns="91425" spcFirstLastPara="1" rIns="91425" wrap="square" tIns="45700">
+            <a:normAutofit/>
+          </a:bodyPr>
+          <a:lstStyle/>
+          <a:p>
+            <a:pPr indent="0" lvl="0" marL="0" rtl="0" algn="ctr">
+              <a:lnSpc>
+                <a:spcPct val="90000"/>
+              </a:lnSpc>
+              <a:spcBef>
+                <a:spcPts val="0"/>
+              </a:spcBef>
+              <a:spcAft>
+                <a:spcPts val="0"/>
+              </a:spcAft>
+              <a:buSzPts val="5400"/>
+              <a:buFont typeface="Rockwell"/>
+              <a:buNone/>
+            </a:pPr>
+            <a:r>
+              <a:rPr lang="es-CO"/>
+              <a:t>RESULTADOS</a:t>
+            </a:r>
+            <a:endParaRPr/>
+          </a:p>
+        </p:txBody>
+      </p:sp>
+      <p:sp>
+        <p:nvSpPr>
+          <p:cNvPr id="213" name="Google Shape;213;g104ffd182bf_0_43"/>
+          <p:cNvSpPr txBox="1"/>
+          <p:nvPr/>
+        </p:nvSpPr>
+        <p:spPr>
+          <a:xfrm>
+            <a:off x="1199250" y="1056000"/>
+            <a:ext cx="9793500" cy="492600"/>
+          </a:xfrm>
+          <a:prstGeom prst="rect">
+            <a:avLst/>
+          </a:prstGeom>
+          <a:noFill/>
+          <a:ln>
+            <a:noFill/>
+          </a:ln>
+        </p:spPr>
+        <p:txBody>
+          <a:bodyPr anchorCtr="0" anchor="t" bIns="91425" lIns="91425" spcFirstLastPara="1" rIns="91425" wrap="square" tIns="91425">
+            <a:spAutoFit/>
+          </a:bodyPr>
+          <a:lstStyle/>
+          <a:p>
+            <a:pPr indent="0" lvl="0" marL="0" rtl="0" algn="ctr">
+              <a:spcBef>
+                <a:spcPts val="0"/>
+              </a:spcBef>
+              <a:spcAft>
+                <a:spcPts val="0"/>
+              </a:spcAft>
+              <a:buNone/>
+            </a:pPr>
+            <a:r>
+              <a:rPr lang="es-CO" sz="2000">
+                <a:latin typeface="Rockwell"/>
+                <a:ea typeface="Rockwell"/>
+                <a:cs typeface="Rockwell"/>
+                <a:sym typeface="Rockwell"/>
+              </a:rPr>
+              <a:t>Análisis de sensibilidad parámetro h  [-0.5, -0.8 -1.0 -1.2 -1.5].</a:t>
+            </a:r>
+            <a:endParaRPr sz="2000">
+              <a:latin typeface="Rockwell"/>
+              <a:ea typeface="Rockwell"/>
+              <a:cs typeface="Rockwell"/>
+              <a:sym typeface="Rockwell"/>
+            </a:endParaRPr>
+          </a:p>
+        </p:txBody>
+      </p:sp>
+      <p:sp>
+        <p:nvSpPr>
+          <p:cNvPr id="214" name="Google Shape;214;g104ffd182bf_0_43"/>
+          <p:cNvSpPr txBox="1"/>
+          <p:nvPr/>
+        </p:nvSpPr>
+        <p:spPr>
+          <a:xfrm>
+            <a:off x="872350" y="1752025"/>
+            <a:ext cx="4251000" cy="400200"/>
+          </a:xfrm>
+          <a:prstGeom prst="rect">
+            <a:avLst/>
+          </a:prstGeom>
+          <a:noFill/>
+          <a:ln cap="flat" cmpd="sng" w="9525">
+            <a:solidFill>
+              <a:srgbClr val="FF0000"/>
+            </a:solidFill>
+            <a:prstDash val="solid"/>
+            <a:round/>
+            <a:headEnd len="sm" w="sm" type="none"/>
+            <a:tailEnd len="sm" w="sm" type="none"/>
+          </a:ln>
+        </p:spPr>
+        <p:txBody>
+          <a:bodyPr anchorCtr="0" anchor="t" bIns="91425" lIns="91425" spcFirstLastPara="1" rIns="91425" wrap="square" tIns="91425">
+            <a:spAutoFit/>
+          </a:bodyPr>
+          <a:lstStyle/>
+          <a:p>
+            <a:pPr indent="0" lvl="0" marL="0" rtl="0" algn="ctr">
+              <a:spcBef>
+                <a:spcPts val="0"/>
+              </a:spcBef>
+              <a:spcAft>
+                <a:spcPts val="0"/>
+              </a:spcAft>
+              <a:buNone/>
+            </a:pPr>
+            <a:r>
+              <a:rPr lang="es-CO">
+                <a:solidFill>
+                  <a:srgbClr val="FF0000"/>
+                </a:solidFill>
+                <a:latin typeface="Rockwell"/>
+                <a:ea typeface="Rockwell"/>
+                <a:cs typeface="Rockwell"/>
+                <a:sym typeface="Rockwell"/>
+              </a:rPr>
+              <a:t>Modelo Newtoniano</a:t>
+            </a:r>
+            <a:r>
+              <a:rPr lang="es-CO">
+                <a:latin typeface="Rockwell"/>
+                <a:ea typeface="Rockwell"/>
+                <a:cs typeface="Rockwell"/>
+                <a:sym typeface="Rockwell"/>
+              </a:rPr>
+              <a:t> </a:t>
+            </a:r>
+            <a:endParaRPr>
+              <a:latin typeface="Rockwell"/>
+              <a:ea typeface="Rockwell"/>
+              <a:cs typeface="Rockwell"/>
+              <a:sym typeface="Rockwell"/>
+            </a:endParaRPr>
+          </a:p>
+        </p:txBody>
+      </p:sp>
+      <p:sp>
+        <p:nvSpPr>
+          <p:cNvPr id="215" name="Google Shape;215;g104ffd182bf_0_43"/>
+          <p:cNvSpPr txBox="1"/>
+          <p:nvPr/>
+        </p:nvSpPr>
+        <p:spPr>
+          <a:xfrm>
+            <a:off x="7068650" y="1752125"/>
+            <a:ext cx="4251000" cy="400200"/>
+          </a:xfrm>
+          <a:prstGeom prst="rect">
+            <a:avLst/>
+          </a:prstGeom>
+          <a:noFill/>
+          <a:ln cap="flat" cmpd="sng" w="9525">
+            <a:solidFill>
+              <a:srgbClr val="0000FF"/>
+            </a:solidFill>
+            <a:prstDash val="solid"/>
+            <a:round/>
+            <a:headEnd len="sm" w="sm" type="none"/>
+            <a:tailEnd len="sm" w="sm" type="none"/>
+          </a:ln>
+        </p:spPr>
+        <p:txBody>
+          <a:bodyPr anchorCtr="0" anchor="t" bIns="91425" lIns="91425" spcFirstLastPara="1" rIns="91425" wrap="square" tIns="91425">
+            <a:spAutoFit/>
+          </a:bodyPr>
+          <a:lstStyle/>
+          <a:p>
+            <a:pPr indent="0" lvl="0" marL="0" rtl="0" algn="ctr">
+              <a:spcBef>
+                <a:spcPts val="0"/>
+              </a:spcBef>
+              <a:spcAft>
+                <a:spcPts val="0"/>
+              </a:spcAft>
+              <a:buNone/>
+            </a:pPr>
+            <a:r>
+              <a:rPr lang="es-CO">
+                <a:solidFill>
+                  <a:srgbClr val="0000FF"/>
+                </a:solidFill>
+                <a:latin typeface="Rockwell"/>
+                <a:ea typeface="Rockwell"/>
+                <a:cs typeface="Rockwell"/>
+                <a:sym typeface="Rockwell"/>
+              </a:rPr>
+              <a:t>Modelo Relativista </a:t>
+            </a:r>
+            <a:endParaRPr>
+              <a:solidFill>
+                <a:srgbClr val="0000FF"/>
+              </a:solidFill>
+              <a:latin typeface="Rockwell"/>
+              <a:ea typeface="Rockwell"/>
+              <a:cs typeface="Rockwell"/>
+              <a:sym typeface="Rockwell"/>
+            </a:endParaRPr>
+          </a:p>
+        </p:txBody>
+      </p:sp>
+      <p:pic>
+        <p:nvPicPr>
+          <p:cNvPr id="216" name="Google Shape;216;g104ffd182bf_0_43"/>
+          <p:cNvPicPr preferRelativeResize="0"/>
+          <p:nvPr/>
+        </p:nvPicPr>
+        <p:blipFill>
+          <a:blip r:embed="rId3">
+            <a:alphaModFix/>
+          </a:blip>
+          <a:stretch>
+            <a:fillRect/>
+          </a:stretch>
+        </p:blipFill>
+        <p:spPr>
+          <a:xfrm>
+            <a:off x="0" y="2355650"/>
+            <a:ext cx="5976174" cy="3459624"/>
+          </a:xfrm>
+          <a:prstGeom prst="rect">
+            <a:avLst/>
+          </a:prstGeom>
+          <a:noFill/>
+          <a:ln>
+            <a:noFill/>
+          </a:ln>
+        </p:spPr>
+      </p:pic>
+      <p:pic>
+        <p:nvPicPr>
+          <p:cNvPr id="217" name="Google Shape;217;g104ffd182bf_0_43"/>
+          <p:cNvPicPr preferRelativeResize="0"/>
+          <p:nvPr/>
+        </p:nvPicPr>
+        <p:blipFill>
+          <a:blip r:embed="rId4">
+            <a:alphaModFix/>
+          </a:blip>
+          <a:stretch>
+            <a:fillRect/>
+          </a:stretch>
+        </p:blipFill>
+        <p:spPr>
+          <a:xfrm>
+            <a:off x="6137650" y="2355850"/>
+            <a:ext cx="6054350" cy="3459624"/>
+          </a:xfrm>
+          <a:prstGeom prst="rect">
+            <a:avLst/>
+          </a:prstGeom>
+          <a:noFill/>
+          <a:ln>
+            <a:noFill/>
+          </a:ln>
+        </p:spPr>
+      </p:pic>
+    </p:spTree>
+  </p:cSld>
+  <p:clrMapOvr>
+    <a:masterClrMapping/>
+  </p:clrMapOvr>
+</p:sld>
+</file>
+
+<file path=ppt/slides/slide12.xml><?xml version="1.0" encoding="utf-8"?>
+<p:sld xmlns:a="http://schemas.openxmlformats.org/drawingml/2006/main" xmlns:r="http://schemas.openxmlformats.org/officeDocument/2006/relationships" xmlns:mc="http://schemas.openxmlformats.org/markup-compatibility/2006" xmlns:mv="urn:schemas-microsoft-com:mac:vml" xmlns:p="http://schemas.openxmlformats.org/presentationml/2006/main" xmlns:c="http://schemas.openxmlformats.org/drawingml/2006/chart" xmlns:dgm="http://schemas.openxmlformats.org/drawingml/2006/diagram" xmlns:o="urn:schemas-microsoft-com:office:office" xmlns:v="urn:schemas-microsoft-com:vml" xmlns:pvml="urn:schemas-microsoft-com:office:powerpoint" xmlns:com="http://schemas.openxmlformats.org/drawingml/2006/compatibility" xmlns:p14="http://schemas.microsoft.com/office/powerpoint/2010/main" xmlns:p15="http://schemas.microsoft.com/office/powerpoint/2012/main" xmlns:ahyp="http://schemas.microsoft.com/office/drawing/2018/hyperlinkcolor">
+  <p:cSld>
+    <p:spTree>
+      <p:nvGrpSpPr>
+        <p:cNvPr id="221" name="Shape 221"/>
+        <p:cNvGrpSpPr/>
+        <p:nvPr/>
+      </p:nvGrpSpPr>
+      <p:grpSpPr>
+        <a:xfrm>
+          <a:off x="0" y="0"/>
+          <a:ext cx="0" cy="0"/>
+          <a:chOff x="0" y="0"/>
+          <a:chExt cx="0" cy="0"/>
+        </a:xfrm>
+      </p:grpSpPr>
+      <p:sp>
+        <p:nvSpPr>
+          <p:cNvPr id="222" name="Google Shape;222;p5"/>
           <p:cNvSpPr txBox="1"/>
           <p:nvPr>
             <p:ph type="title"/>
@@ -16104,7 +16972,7 @@
       </p:sp>
       <p:sp>
         <p:nvSpPr>
-          <p:cNvPr id="200" name="Google Shape;200;p5"/>
+          <p:cNvPr id="223" name="Google Shape;223;p5"/>
           <p:cNvSpPr txBox="1"/>
           <p:nvPr>
             <p:ph idx="1" type="body"/>
@@ -16209,12 +17077,12 @@
 </p:sld>
 </file>
 
-<file path=ppt/slides/slide11.xml><?xml version="1.0" encoding="utf-8"?>
+<file path=ppt/slides/slide13.xml><?xml version="1.0" encoding="utf-8"?>
 <p:sld xmlns:a="http://schemas.openxmlformats.org/drawingml/2006/main" xmlns:r="http://schemas.openxmlformats.org/officeDocument/2006/relationships" xmlns:mc="http://schemas.openxmlformats.org/markup-compatibility/2006" xmlns:mv="urn:schemas-microsoft-com:mac:vml" xmlns:p="http://schemas.openxmlformats.org/presentationml/2006/main" xmlns:c="http://schemas.openxmlformats.org/drawingml/2006/chart" xmlns:dgm="http://schemas.openxmlformats.org/drawingml/2006/diagram" xmlns:o="urn:schemas-microsoft-com:office:office" xmlns:v="urn:schemas-microsoft-com:vml" xmlns:pvml="urn:schemas-microsoft-com:office:powerpoint" xmlns:com="http://schemas.openxmlformats.org/drawingml/2006/compatibility" xmlns:p14="http://schemas.microsoft.com/office/powerpoint/2010/main" xmlns:p15="http://schemas.microsoft.com/office/powerpoint/2012/main" xmlns:ahyp="http://schemas.microsoft.com/office/drawing/2018/hyperlinkcolor">
   <p:cSld>
     <p:spTree>
       <p:nvGrpSpPr>
-        <p:cNvPr id="204" name="Shape 204"/>
+        <p:cNvPr id="227" name="Shape 227"/>
         <p:cNvGrpSpPr/>
         <p:nvPr/>
       </p:nvGrpSpPr>
@@ -16228,7 +17096,7 @@
       </p:grpSpPr>
       <p:sp>
         <p:nvSpPr>
-          <p:cNvPr id="205" name="Google Shape;205;p6"/>
+          <p:cNvPr id="228" name="Google Shape;228;p6"/>
           <p:cNvSpPr txBox="1"/>
           <p:nvPr>
             <p:ph idx="1" type="body"/>
@@ -16390,7 +17258,7 @@
       </p:sp>
       <p:sp>
         <p:nvSpPr>
-          <p:cNvPr id="206" name="Google Shape;206;p6"/>
+          <p:cNvPr id="229" name="Google Shape;229;p6"/>
           <p:cNvSpPr txBox="1"/>
           <p:nvPr>
             <p:ph type="title"/>
@@ -16445,12 +17313,12 @@
 </p:sld>
 </file>
 
-<file path=ppt/slides/slide12.xml><?xml version="1.0" encoding="utf-8"?>
+<file path=ppt/slides/slide14.xml><?xml version="1.0" encoding="utf-8"?>
 <p:sld xmlns:a="http://schemas.openxmlformats.org/drawingml/2006/main" xmlns:r="http://schemas.openxmlformats.org/officeDocument/2006/relationships" xmlns:mc="http://schemas.openxmlformats.org/markup-compatibility/2006" xmlns:mv="urn:schemas-microsoft-com:mac:vml" xmlns:p="http://schemas.openxmlformats.org/presentationml/2006/main" xmlns:c="http://schemas.openxmlformats.org/drawingml/2006/chart" xmlns:dgm="http://schemas.openxmlformats.org/drawingml/2006/diagram" xmlns:o="urn:schemas-microsoft-com:office:office" xmlns:v="urn:schemas-microsoft-com:vml" xmlns:pvml="urn:schemas-microsoft-com:office:powerpoint" xmlns:com="http://schemas.openxmlformats.org/drawingml/2006/compatibility" xmlns:p14="http://schemas.microsoft.com/office/powerpoint/2010/main" xmlns:p15="http://schemas.microsoft.com/office/powerpoint/2012/main" xmlns:ahyp="http://schemas.microsoft.com/office/drawing/2018/hyperlinkcolor">
   <p:cSld>
     <p:spTree>
       <p:nvGrpSpPr>
-        <p:cNvPr id="210" name="Shape 210"/>
+        <p:cNvPr id="233" name="Shape 233"/>
         <p:cNvGrpSpPr/>
         <p:nvPr/>
       </p:nvGrpSpPr>
@@ -16464,7 +17332,7 @@
       </p:grpSpPr>
       <p:sp>
         <p:nvSpPr>
-          <p:cNvPr id="211" name="Google Shape;211;p7"/>
+          <p:cNvPr id="234" name="Google Shape;234;p7"/>
           <p:cNvSpPr txBox="1"/>
           <p:nvPr>
             <p:ph type="title"/>
@@ -17061,7 +17929,7 @@
         <p:spPr>
           <a:xfrm>
             <a:off x="3663150" y="4632150"/>
-            <a:ext cx="5230775" cy="1753500"/>
+            <a:ext cx="4402675" cy="1475900"/>
           </a:xfrm>
           <a:prstGeom prst="rect">
             <a:avLst/>
@@ -17135,7 +18003,7 @@
         <p:spPr>
           <a:xfrm>
             <a:off x="984475" y="1715525"/>
-            <a:ext cx="5433052" cy="1056000"/>
+            <a:ext cx="4688449" cy="911275"/>
           </a:xfrm>
           <a:prstGeom prst="rect">
             <a:avLst/>
@@ -17163,7 +18031,7 @@
         <p:spPr>
           <a:xfrm>
             <a:off x="2191250" y="2771525"/>
-            <a:ext cx="3019494" cy="1056000"/>
+            <a:ext cx="2571575" cy="899349"/>
           </a:xfrm>
           <a:prstGeom prst="rect">
             <a:avLst/>
@@ -17294,8 +18162,8 @@
         </p:blipFill>
         <p:spPr>
           <a:xfrm>
-            <a:off x="8164525" y="1820326"/>
-            <a:ext cx="2571575" cy="696150"/>
+            <a:off x="8164525" y="1820325"/>
+            <a:ext cx="1932699" cy="523200"/>
           </a:xfrm>
           <a:prstGeom prst="rect">
             <a:avLst/>
@@ -17322,8 +18190,8 @@
         </p:blipFill>
         <p:spPr>
           <a:xfrm>
-            <a:off x="7966305" y="2757608"/>
-            <a:ext cx="3289650" cy="696150"/>
+            <a:off x="7966300" y="2757601"/>
+            <a:ext cx="3076575" cy="651059"/>
           </a:xfrm>
           <a:prstGeom prst="rect">
             <a:avLst/>
@@ -18697,7 +19565,7 @@
       </p:grpSpPr>
       <p:sp>
         <p:nvSpPr>
-          <p:cNvPr id="151" name="Google Shape;151;gf8306ab00d_0_22"/>
+          <p:cNvPr id="151" name="Google Shape;151;gcfb26b7588_0_0"/>
           <p:cNvSpPr txBox="1"/>
           <p:nvPr>
             <p:ph type="title"/>
@@ -18738,6 +19606,600 @@
             </a:pPr>
             <a:r>
               <a:rPr lang="es-CO"/>
+              <a:t>ADIMENSIONALIZACIÓN</a:t>
+            </a:r>
+            <a:endParaRPr/>
+          </a:p>
+        </p:txBody>
+      </p:sp>
+      <p:sp>
+        <p:nvSpPr>
+          <p:cNvPr id="152" name="Google Shape;152;gcfb26b7588_0_0"/>
+          <p:cNvSpPr txBox="1"/>
+          <p:nvPr/>
+        </p:nvSpPr>
+        <p:spPr>
+          <a:xfrm>
+            <a:off x="1116925" y="1821975"/>
+            <a:ext cx="9793500" cy="400200"/>
+          </a:xfrm>
+          <a:prstGeom prst="rect">
+            <a:avLst/>
+          </a:prstGeom>
+          <a:noFill/>
+          <a:ln>
+            <a:noFill/>
+          </a:ln>
+        </p:spPr>
+        <p:txBody>
+          <a:bodyPr anchorCtr="0" anchor="t" bIns="91425" lIns="91425" spcFirstLastPara="1" rIns="91425" wrap="square" tIns="91425">
+            <a:spAutoFit/>
+          </a:bodyPr>
+          <a:lstStyle/>
+          <a:p>
+            <a:pPr indent="0" lvl="0" marL="0" rtl="0" algn="l">
+              <a:spcBef>
+                <a:spcPts val="0"/>
+              </a:spcBef>
+              <a:spcAft>
+                <a:spcPts val="0"/>
+              </a:spcAft>
+              <a:buNone/>
+            </a:pPr>
+            <a:r>
+              <a:t/>
+            </a:r>
+            <a:endParaRPr>
+              <a:latin typeface="Rockwell"/>
+              <a:ea typeface="Rockwell"/>
+              <a:cs typeface="Rockwell"/>
+              <a:sym typeface="Rockwell"/>
+            </a:endParaRPr>
+          </a:p>
+        </p:txBody>
+      </p:sp>
+      <p:sp>
+        <p:nvSpPr>
+          <p:cNvPr id="153" name="Google Shape;153;gcfb26b7588_0_0"/>
+          <p:cNvSpPr txBox="1"/>
+          <p:nvPr/>
+        </p:nvSpPr>
+        <p:spPr>
+          <a:xfrm>
+            <a:off x="3297175" y="1056000"/>
+            <a:ext cx="5433000" cy="523200"/>
+          </a:xfrm>
+          <a:prstGeom prst="rect">
+            <a:avLst/>
+          </a:prstGeom>
+          <a:noFill/>
+          <a:ln>
+            <a:noFill/>
+          </a:ln>
+        </p:spPr>
+        <p:txBody>
+          <a:bodyPr anchorCtr="0" anchor="t" bIns="91425" lIns="91425" spcFirstLastPara="1" rIns="91425" wrap="square" tIns="91425">
+            <a:spAutoFit/>
+          </a:bodyPr>
+          <a:lstStyle/>
+          <a:p>
+            <a:pPr indent="0" lvl="0" marL="0" rtl="0" algn="l">
+              <a:spcBef>
+                <a:spcPts val="0"/>
+              </a:spcBef>
+              <a:spcAft>
+                <a:spcPts val="0"/>
+              </a:spcAft>
+              <a:buNone/>
+            </a:pPr>
+            <a:r>
+              <a:rPr lang="es-CO" sz="2200">
+                <a:latin typeface="Rockwell"/>
+                <a:ea typeface="Rockwell"/>
+                <a:cs typeface="Rockwell"/>
+                <a:sym typeface="Rockwell"/>
+              </a:rPr>
+              <a:t>Parámetros característicos del sistema</a:t>
+            </a:r>
+            <a:endParaRPr sz="2200">
+              <a:latin typeface="Rockwell"/>
+              <a:ea typeface="Rockwell"/>
+              <a:cs typeface="Rockwell"/>
+              <a:sym typeface="Rockwell"/>
+            </a:endParaRPr>
+          </a:p>
+        </p:txBody>
+      </p:sp>
+      <p:sp>
+        <p:nvSpPr>
+          <p:cNvPr id="154" name="Google Shape;154;gcfb26b7588_0_0"/>
+          <p:cNvSpPr txBox="1"/>
+          <p:nvPr/>
+        </p:nvSpPr>
+        <p:spPr>
+          <a:xfrm>
+            <a:off x="4611750" y="3554875"/>
+            <a:ext cx="2968500" cy="523200"/>
+          </a:xfrm>
+          <a:prstGeom prst="rect">
+            <a:avLst/>
+          </a:prstGeom>
+          <a:noFill/>
+          <a:ln>
+            <a:noFill/>
+          </a:ln>
+        </p:spPr>
+        <p:txBody>
+          <a:bodyPr anchorCtr="0" anchor="t" bIns="91425" lIns="91425" spcFirstLastPara="1" rIns="91425" wrap="square" tIns="91425">
+            <a:spAutoFit/>
+          </a:bodyPr>
+          <a:lstStyle/>
+          <a:p>
+            <a:pPr indent="0" lvl="0" marL="0" rtl="0" algn="l">
+              <a:spcBef>
+                <a:spcPts val="0"/>
+              </a:spcBef>
+              <a:spcAft>
+                <a:spcPts val="0"/>
+              </a:spcAft>
+              <a:buNone/>
+            </a:pPr>
+            <a:r>
+              <a:rPr lang="es-CO" sz="2200">
+                <a:latin typeface="Rockwell"/>
+                <a:ea typeface="Rockwell"/>
+                <a:cs typeface="Rockwell"/>
+                <a:sym typeface="Rockwell"/>
+              </a:rPr>
+              <a:t>Parámetros auxiliares </a:t>
+            </a:r>
+            <a:endParaRPr sz="3000">
+              <a:latin typeface="Rockwell"/>
+              <a:ea typeface="Rockwell"/>
+              <a:cs typeface="Rockwell"/>
+              <a:sym typeface="Rockwell"/>
+            </a:endParaRPr>
+          </a:p>
+        </p:txBody>
+      </p:sp>
+      <p:pic>
+        <p:nvPicPr>
+          <p:cNvPr id="155" name="Google Shape;155;gcfb26b7588_0_0"/>
+          <p:cNvPicPr preferRelativeResize="0"/>
+          <p:nvPr/>
+        </p:nvPicPr>
+        <p:blipFill>
+          <a:blip r:embed="rId3">
+            <a:alphaModFix/>
+          </a:blip>
+          <a:stretch>
+            <a:fillRect/>
+          </a:stretch>
+        </p:blipFill>
+        <p:spPr>
+          <a:xfrm>
+            <a:off x="2320413" y="1944800"/>
+            <a:ext cx="7386550" cy="959300"/>
+          </a:xfrm>
+          <a:prstGeom prst="rect">
+            <a:avLst/>
+          </a:prstGeom>
+          <a:noFill/>
+          <a:ln>
+            <a:noFill/>
+          </a:ln>
+        </p:spPr>
+      </p:pic>
+      <p:pic>
+        <p:nvPicPr>
+          <p:cNvPr id="156" name="Google Shape;156;gcfb26b7588_0_0"/>
+          <p:cNvPicPr preferRelativeResize="0"/>
+          <p:nvPr/>
+        </p:nvPicPr>
+        <p:blipFill>
+          <a:blip r:embed="rId4">
+            <a:alphaModFix/>
+          </a:blip>
+          <a:stretch>
+            <a:fillRect/>
+          </a:stretch>
+        </p:blipFill>
+        <p:spPr>
+          <a:xfrm>
+            <a:off x="1858249" y="4353300"/>
+            <a:ext cx="8310839" cy="1056000"/>
+          </a:xfrm>
+          <a:prstGeom prst="rect">
+            <a:avLst/>
+          </a:prstGeom>
+          <a:noFill/>
+          <a:ln>
+            <a:noFill/>
+          </a:ln>
+        </p:spPr>
+      </p:pic>
+    </p:spTree>
+  </p:cSld>
+  <p:clrMapOvr>
+    <a:masterClrMapping/>
+  </p:clrMapOvr>
+</p:sld>
+</file>
+
+<file path=ppt/slides/slide6.xml><?xml version="1.0" encoding="utf-8"?>
+<p:sld xmlns:a="http://schemas.openxmlformats.org/drawingml/2006/main" xmlns:r="http://schemas.openxmlformats.org/officeDocument/2006/relationships" xmlns:mc="http://schemas.openxmlformats.org/markup-compatibility/2006" xmlns:mv="urn:schemas-microsoft-com:mac:vml" xmlns:p="http://schemas.openxmlformats.org/presentationml/2006/main" xmlns:c="http://schemas.openxmlformats.org/drawingml/2006/chart" xmlns:dgm="http://schemas.openxmlformats.org/drawingml/2006/diagram" xmlns:o="urn:schemas-microsoft-com:office:office" xmlns:v="urn:schemas-microsoft-com:vml" xmlns:pvml="urn:schemas-microsoft-com:office:powerpoint" xmlns:com="http://schemas.openxmlformats.org/drawingml/2006/compatibility" xmlns:p14="http://schemas.microsoft.com/office/powerpoint/2010/main" xmlns:p15="http://schemas.microsoft.com/office/powerpoint/2012/main" xmlns:ahyp="http://schemas.microsoft.com/office/drawing/2018/hyperlinkcolor">
+  <p:cSld>
+    <p:spTree>
+      <p:nvGrpSpPr>
+        <p:cNvPr id="160" name="Shape 160"/>
+        <p:cNvGrpSpPr/>
+        <p:nvPr/>
+      </p:nvGrpSpPr>
+      <p:grpSpPr>
+        <a:xfrm>
+          <a:off x="0" y="0"/>
+          <a:ext cx="0" cy="0"/>
+          <a:chOff x="0" y="0"/>
+          <a:chExt cx="0" cy="0"/>
+        </a:xfrm>
+      </p:grpSpPr>
+      <p:sp>
+        <p:nvSpPr>
+          <p:cNvPr id="161" name="Google Shape;161;gcfb26b7588_0_15"/>
+          <p:cNvSpPr txBox="1"/>
+          <p:nvPr>
+            <p:ph type="title"/>
+          </p:nvPr>
+        </p:nvSpPr>
+        <p:spPr>
+          <a:xfrm>
+            <a:off x="984473" y="7"/>
+            <a:ext cx="10058400" cy="1056000"/>
+          </a:xfrm>
+          <a:prstGeom prst="rect">
+            <a:avLst/>
+          </a:prstGeom>
+          <a:noFill/>
+          <a:ln>
+            <a:noFill/>
+          </a:ln>
+        </p:spPr>
+        <p:txBody>
+          <a:bodyPr anchorCtr="0" anchor="ctr" bIns="45700" lIns="91425" spcFirstLastPara="1" rIns="91425" wrap="square" tIns="45700">
+            <a:normAutofit/>
+          </a:bodyPr>
+          <a:lstStyle/>
+          <a:p>
+            <a:pPr indent="0" lvl="0" marL="0" rtl="0" algn="ctr">
+              <a:lnSpc>
+                <a:spcPct val="90000"/>
+              </a:lnSpc>
+              <a:spcBef>
+                <a:spcPts val="0"/>
+              </a:spcBef>
+              <a:spcAft>
+                <a:spcPts val="0"/>
+              </a:spcAft>
+              <a:buSzPts val="5400"/>
+              <a:buFont typeface="Rockwell"/>
+              <a:buNone/>
+            </a:pPr>
+            <a:r>
+              <a:rPr lang="es-CO"/>
+              <a:t>SISTEMA DE ECUACIONES</a:t>
+            </a:r>
+            <a:endParaRPr/>
+          </a:p>
+        </p:txBody>
+      </p:sp>
+      <p:sp>
+        <p:nvSpPr>
+          <p:cNvPr id="162" name="Google Shape;162;gcfb26b7588_0_15"/>
+          <p:cNvSpPr txBox="1"/>
+          <p:nvPr/>
+        </p:nvSpPr>
+        <p:spPr>
+          <a:xfrm>
+            <a:off x="1085625" y="1056000"/>
+            <a:ext cx="2874900" cy="523200"/>
+          </a:xfrm>
+          <a:prstGeom prst="rect">
+            <a:avLst/>
+          </a:prstGeom>
+          <a:noFill/>
+          <a:ln>
+            <a:noFill/>
+          </a:ln>
+        </p:spPr>
+        <p:txBody>
+          <a:bodyPr anchorCtr="0" anchor="t" bIns="91425" lIns="91425" spcFirstLastPara="1" rIns="91425" wrap="square" tIns="91425">
+            <a:spAutoFit/>
+          </a:bodyPr>
+          <a:lstStyle/>
+          <a:p>
+            <a:pPr indent="0" lvl="0" marL="0" rtl="0" algn="l">
+              <a:spcBef>
+                <a:spcPts val="0"/>
+              </a:spcBef>
+              <a:spcAft>
+                <a:spcPts val="0"/>
+              </a:spcAft>
+              <a:buNone/>
+            </a:pPr>
+            <a:r>
+              <a:rPr lang="es-CO" sz="2200">
+                <a:latin typeface="Rockwell"/>
+                <a:ea typeface="Rockwell"/>
+                <a:cs typeface="Rockwell"/>
+                <a:sym typeface="Rockwell"/>
+              </a:rPr>
+              <a:t>Modelo Newtoniano</a:t>
+            </a:r>
+            <a:endParaRPr sz="2200">
+              <a:latin typeface="Rockwell"/>
+              <a:ea typeface="Rockwell"/>
+              <a:cs typeface="Rockwell"/>
+              <a:sym typeface="Rockwell"/>
+            </a:endParaRPr>
+          </a:p>
+        </p:txBody>
+      </p:sp>
+      <p:sp>
+        <p:nvSpPr>
+          <p:cNvPr id="163" name="Google Shape;163;gcfb26b7588_0_15"/>
+          <p:cNvSpPr txBox="1"/>
+          <p:nvPr/>
+        </p:nvSpPr>
+        <p:spPr>
+          <a:xfrm>
+            <a:off x="4576213" y="3822500"/>
+            <a:ext cx="2874900" cy="523200"/>
+          </a:xfrm>
+          <a:prstGeom prst="rect">
+            <a:avLst/>
+          </a:prstGeom>
+          <a:noFill/>
+          <a:ln>
+            <a:noFill/>
+          </a:ln>
+        </p:spPr>
+        <p:txBody>
+          <a:bodyPr anchorCtr="0" anchor="t" bIns="91425" lIns="91425" spcFirstLastPara="1" rIns="91425" wrap="square" tIns="91425">
+            <a:spAutoFit/>
+          </a:bodyPr>
+          <a:lstStyle/>
+          <a:p>
+            <a:pPr indent="0" lvl="0" marL="0" rtl="0" algn="l">
+              <a:spcBef>
+                <a:spcPts val="0"/>
+              </a:spcBef>
+              <a:spcAft>
+                <a:spcPts val="0"/>
+              </a:spcAft>
+              <a:buNone/>
+            </a:pPr>
+            <a:r>
+              <a:rPr lang="es-CO" sz="2200">
+                <a:latin typeface="Rockwell"/>
+                <a:ea typeface="Rockwell"/>
+                <a:cs typeface="Rockwell"/>
+                <a:sym typeface="Rockwell"/>
+              </a:rPr>
+              <a:t>Modelo Relativista</a:t>
+            </a:r>
+            <a:endParaRPr sz="2200">
+              <a:latin typeface="Rockwell"/>
+              <a:ea typeface="Rockwell"/>
+              <a:cs typeface="Rockwell"/>
+              <a:sym typeface="Rockwell"/>
+            </a:endParaRPr>
+          </a:p>
+        </p:txBody>
+      </p:sp>
+      <p:sp>
+        <p:nvSpPr>
+          <p:cNvPr id="164" name="Google Shape;164;gcfb26b7588_0_15"/>
+          <p:cNvSpPr txBox="1"/>
+          <p:nvPr/>
+        </p:nvSpPr>
+        <p:spPr>
+          <a:xfrm>
+            <a:off x="6791125" y="1736950"/>
+            <a:ext cx="2874900" cy="523200"/>
+          </a:xfrm>
+          <a:prstGeom prst="rect">
+            <a:avLst/>
+          </a:prstGeom>
+          <a:noFill/>
+          <a:ln>
+            <a:noFill/>
+          </a:ln>
+        </p:spPr>
+        <p:txBody>
+          <a:bodyPr anchorCtr="0" anchor="t" bIns="91425" lIns="91425" spcFirstLastPara="1" rIns="91425" wrap="square" tIns="91425">
+            <a:spAutoFit/>
+          </a:bodyPr>
+          <a:lstStyle/>
+          <a:p>
+            <a:pPr indent="0" lvl="0" marL="0" rtl="0" algn="l">
+              <a:spcBef>
+                <a:spcPts val="0"/>
+              </a:spcBef>
+              <a:spcAft>
+                <a:spcPts val="0"/>
+              </a:spcAft>
+              <a:buNone/>
+            </a:pPr>
+            <a:r>
+              <a:rPr lang="es-CO" sz="2200">
+                <a:latin typeface="Rockwell"/>
+                <a:ea typeface="Rockwell"/>
+                <a:cs typeface="Rockwell"/>
+                <a:sym typeface="Rockwell"/>
+              </a:rPr>
+              <a:t>Perfil de densidad</a:t>
+            </a:r>
+            <a:endParaRPr sz="2200">
+              <a:latin typeface="Rockwell"/>
+              <a:ea typeface="Rockwell"/>
+              <a:cs typeface="Rockwell"/>
+              <a:sym typeface="Rockwell"/>
+            </a:endParaRPr>
+          </a:p>
+        </p:txBody>
+      </p:sp>
+      <p:pic>
+        <p:nvPicPr>
+          <p:cNvPr id="165" name="Google Shape;165;gcfb26b7588_0_15"/>
+          <p:cNvPicPr preferRelativeResize="0"/>
+          <p:nvPr/>
+        </p:nvPicPr>
+        <p:blipFill>
+          <a:blip r:embed="rId3">
+            <a:alphaModFix/>
+          </a:blip>
+          <a:stretch>
+            <a:fillRect/>
+          </a:stretch>
+        </p:blipFill>
+        <p:spPr>
+          <a:xfrm>
+            <a:off x="1327688" y="1736948"/>
+            <a:ext cx="2390775" cy="1428750"/>
+          </a:xfrm>
+          <a:prstGeom prst="rect">
+            <a:avLst/>
+          </a:prstGeom>
+          <a:noFill/>
+          <a:ln>
+            <a:noFill/>
+          </a:ln>
+        </p:spPr>
+      </p:pic>
+      <p:pic>
+        <p:nvPicPr>
+          <p:cNvPr id="166" name="Google Shape;166;gcfb26b7588_0_15"/>
+          <p:cNvPicPr preferRelativeResize="0"/>
+          <p:nvPr/>
+        </p:nvPicPr>
+        <p:blipFill>
+          <a:blip r:embed="rId4">
+            <a:alphaModFix/>
+          </a:blip>
+          <a:stretch>
+            <a:fillRect/>
+          </a:stretch>
+        </p:blipFill>
+        <p:spPr>
+          <a:xfrm>
+            <a:off x="2381250" y="4508600"/>
+            <a:ext cx="7429500" cy="1562100"/>
+          </a:xfrm>
+          <a:prstGeom prst="rect">
+            <a:avLst/>
+          </a:prstGeom>
+          <a:noFill/>
+          <a:ln>
+            <a:noFill/>
+          </a:ln>
+        </p:spPr>
+      </p:pic>
+      <p:pic>
+        <p:nvPicPr>
+          <p:cNvPr id="167" name="Google Shape;167;gcfb26b7588_0_15"/>
+          <p:cNvPicPr preferRelativeResize="0"/>
+          <p:nvPr/>
+        </p:nvPicPr>
+        <p:blipFill>
+          <a:blip r:embed="rId5">
+            <a:alphaModFix/>
+          </a:blip>
+          <a:stretch>
+            <a:fillRect/>
+          </a:stretch>
+        </p:blipFill>
+        <p:spPr>
+          <a:xfrm>
+            <a:off x="7033188" y="2395774"/>
+            <a:ext cx="2390775" cy="580495"/>
+          </a:xfrm>
+          <a:prstGeom prst="rect">
+            <a:avLst/>
+          </a:prstGeom>
+          <a:noFill/>
+          <a:ln>
+            <a:noFill/>
+          </a:ln>
+        </p:spPr>
+      </p:pic>
+    </p:spTree>
+  </p:cSld>
+  <p:clrMapOvr>
+    <a:masterClrMapping/>
+  </p:clrMapOvr>
+</p:sld>
+</file>
+
+<file path=ppt/slides/slide7.xml><?xml version="1.0" encoding="utf-8"?>
+<p:sld xmlns:a="http://schemas.openxmlformats.org/drawingml/2006/main" xmlns:r="http://schemas.openxmlformats.org/officeDocument/2006/relationships" xmlns:mc="http://schemas.openxmlformats.org/markup-compatibility/2006" xmlns:mv="urn:schemas-microsoft-com:mac:vml" xmlns:p="http://schemas.openxmlformats.org/presentationml/2006/main" xmlns:c="http://schemas.openxmlformats.org/drawingml/2006/chart" xmlns:dgm="http://schemas.openxmlformats.org/drawingml/2006/diagram" xmlns:o="urn:schemas-microsoft-com:office:office" xmlns:v="urn:schemas-microsoft-com:vml" xmlns:pvml="urn:schemas-microsoft-com:office:powerpoint" xmlns:com="http://schemas.openxmlformats.org/drawingml/2006/compatibility" xmlns:p14="http://schemas.microsoft.com/office/powerpoint/2010/main" xmlns:p15="http://schemas.microsoft.com/office/powerpoint/2012/main" xmlns:ahyp="http://schemas.microsoft.com/office/drawing/2018/hyperlinkcolor">
+  <p:cSld>
+    <p:spTree>
+      <p:nvGrpSpPr>
+        <p:cNvPr id="171" name="Shape 171"/>
+        <p:cNvGrpSpPr/>
+        <p:nvPr/>
+      </p:nvGrpSpPr>
+      <p:grpSpPr>
+        <a:xfrm>
+          <a:off x="0" y="0"/>
+          <a:ext cx="0" cy="0"/>
+          <a:chOff x="0" y="0"/>
+          <a:chExt cx="0" cy="0"/>
+        </a:xfrm>
+      </p:grpSpPr>
+      <p:sp>
+        <p:nvSpPr>
+          <p:cNvPr id="172" name="Google Shape;172;gf8306ab00d_0_22"/>
+          <p:cNvSpPr txBox="1"/>
+          <p:nvPr>
+            <p:ph type="title"/>
+          </p:nvPr>
+        </p:nvSpPr>
+        <p:spPr>
+          <a:xfrm>
+            <a:off x="984473" y="7"/>
+            <a:ext cx="10058400" cy="1056000"/>
+          </a:xfrm>
+          <a:prstGeom prst="rect">
+            <a:avLst/>
+          </a:prstGeom>
+          <a:noFill/>
+          <a:ln>
+            <a:noFill/>
+          </a:ln>
+        </p:spPr>
+        <p:txBody>
+          <a:bodyPr anchorCtr="0" anchor="ctr" bIns="45700" lIns="91425" spcFirstLastPara="1" rIns="91425" wrap="square" tIns="45700">
+            <a:normAutofit/>
+          </a:bodyPr>
+          <a:lstStyle/>
+          <a:p>
+            <a:pPr indent="0" lvl="0" marL="0" rtl="0" algn="ctr">
+              <a:lnSpc>
+                <a:spcPct val="90000"/>
+              </a:lnSpc>
+              <a:spcBef>
+                <a:spcPts val="0"/>
+              </a:spcBef>
+              <a:spcAft>
+                <a:spcPts val="0"/>
+              </a:spcAft>
+              <a:buSzPts val="5400"/>
+              <a:buFont typeface="Rockwell"/>
+              <a:buNone/>
+            </a:pPr>
+            <a:r>
+              <a:rPr lang="es-CO"/>
               <a:t>RESULTADOS</a:t>
             </a:r>
             <a:endParaRPr/>
@@ -18746,7 +20208,7 @@
       </p:sp>
       <p:pic>
         <p:nvPicPr>
-          <p:cNvPr id="152" name="Google Shape;152;gf8306ab00d_0_22"/>
+          <p:cNvPr id="173" name="Google Shape;173;gf8306ab00d_0_22"/>
           <p:cNvPicPr preferRelativeResize="0"/>
           <p:nvPr/>
         </p:nvPicPr>
@@ -18773,7 +20235,7 @@
       </p:pic>
       <p:sp>
         <p:nvSpPr>
-          <p:cNvPr id="153" name="Google Shape;153;gf8306ab00d_0_22"/>
+          <p:cNvPr id="174" name="Google Shape;174;gf8306ab00d_0_22"/>
           <p:cNvSpPr txBox="1"/>
           <p:nvPr/>
         </p:nvSpPr>
@@ -18825,13 +20287,13 @@
       </p:sp>
       <p:sp>
         <p:nvSpPr>
-          <p:cNvPr id="154" name="Google Shape;154;gf8306ab00d_0_22"/>
+          <p:cNvPr id="175" name="Google Shape;175;gf8306ab00d_0_22"/>
           <p:cNvSpPr txBox="1"/>
           <p:nvPr/>
         </p:nvSpPr>
         <p:spPr>
           <a:xfrm>
-            <a:off x="10297250" y="1924325"/>
+            <a:off x="10171100" y="1548600"/>
             <a:ext cx="1515000" cy="1569900"/>
           </a:xfrm>
           <a:prstGeom prst="rect">
@@ -19009,6 +20471,214 @@
           </a:p>
         </p:txBody>
       </p:sp>
+      <p:sp>
+        <p:nvSpPr>
+          <p:cNvPr id="176" name="Google Shape;176;gf8306ab00d_0_22"/>
+          <p:cNvSpPr txBox="1"/>
+          <p:nvPr/>
+        </p:nvSpPr>
+        <p:spPr>
+          <a:xfrm>
+            <a:off x="10171100" y="3228100"/>
+            <a:ext cx="1515000" cy="1293000"/>
+          </a:xfrm>
+          <a:prstGeom prst="rect">
+            <a:avLst/>
+          </a:prstGeom>
+          <a:noFill/>
+          <a:ln>
+            <a:noFill/>
+          </a:ln>
+        </p:spPr>
+        <p:txBody>
+          <a:bodyPr anchorCtr="0" anchor="t" bIns="91425" lIns="91425" spcFirstLastPara="1" rIns="91425" wrap="square" tIns="91425">
+            <a:spAutoFit/>
+          </a:bodyPr>
+          <a:lstStyle/>
+          <a:p>
+            <a:pPr indent="0" lvl="0" marL="0" rtl="0" algn="l">
+              <a:spcBef>
+                <a:spcPts val="0"/>
+              </a:spcBef>
+              <a:spcAft>
+                <a:spcPts val="0"/>
+              </a:spcAft>
+              <a:buNone/>
+            </a:pPr>
+            <a:r>
+              <a:rPr lang="es-CO" sz="1800">
+                <a:latin typeface="Rockwell"/>
+                <a:ea typeface="Rockwell"/>
+                <a:cs typeface="Rockwell"/>
+                <a:sym typeface="Rockwell"/>
+              </a:rPr>
+              <a:t>P(0) Caso Newtoniano</a:t>
+            </a:r>
+            <a:endParaRPr sz="1800">
+              <a:latin typeface="Rockwell"/>
+              <a:ea typeface="Rockwell"/>
+              <a:cs typeface="Rockwell"/>
+              <a:sym typeface="Rockwell"/>
+            </a:endParaRPr>
+          </a:p>
+          <a:p>
+            <a:pPr indent="0" lvl="0" marL="0" rtl="0" algn="l">
+              <a:spcBef>
+                <a:spcPts val="0"/>
+              </a:spcBef>
+              <a:spcAft>
+                <a:spcPts val="0"/>
+              </a:spcAft>
+              <a:buNone/>
+            </a:pPr>
+            <a:r>
+              <a:rPr lang="es-CO" sz="1800">
+                <a:latin typeface="Rockwell"/>
+                <a:ea typeface="Rockwell"/>
+                <a:cs typeface="Rockwell"/>
+                <a:sym typeface="Rockwell"/>
+              </a:rPr>
+              <a:t>r = 0.79</a:t>
+            </a:r>
+            <a:endParaRPr sz="1800">
+              <a:latin typeface="Rockwell"/>
+              <a:ea typeface="Rockwell"/>
+              <a:cs typeface="Rockwell"/>
+              <a:sym typeface="Rockwell"/>
+            </a:endParaRPr>
+          </a:p>
+          <a:p>
+            <a:pPr indent="0" lvl="0" marL="0" rtl="0" algn="l">
+              <a:spcBef>
+                <a:spcPts val="0"/>
+              </a:spcBef>
+              <a:spcAft>
+                <a:spcPts val="0"/>
+              </a:spcAft>
+              <a:buNone/>
+            </a:pPr>
+            <a:r>
+              <a:rPr lang="es-CO" sz="1800">
+                <a:latin typeface="Rockwell"/>
+                <a:ea typeface="Rockwell"/>
+                <a:cs typeface="Rockwell"/>
+                <a:sym typeface="Rockwell"/>
+              </a:rPr>
+              <a:t>m = 1.1</a:t>
+            </a:r>
+            <a:endParaRPr sz="1800">
+              <a:latin typeface="Rockwell"/>
+              <a:ea typeface="Rockwell"/>
+              <a:cs typeface="Rockwell"/>
+              <a:sym typeface="Rockwell"/>
+            </a:endParaRPr>
+          </a:p>
+        </p:txBody>
+      </p:sp>
+      <p:sp>
+        <p:nvSpPr>
+          <p:cNvPr id="177" name="Google Shape;177;gf8306ab00d_0_22"/>
+          <p:cNvSpPr txBox="1"/>
+          <p:nvPr/>
+        </p:nvSpPr>
+        <p:spPr>
+          <a:xfrm>
+            <a:off x="10171100" y="4595575"/>
+            <a:ext cx="1515000" cy="1293000"/>
+          </a:xfrm>
+          <a:prstGeom prst="rect">
+            <a:avLst/>
+          </a:prstGeom>
+          <a:noFill/>
+          <a:ln>
+            <a:noFill/>
+          </a:ln>
+        </p:spPr>
+        <p:txBody>
+          <a:bodyPr anchorCtr="0" anchor="t" bIns="91425" lIns="91425" spcFirstLastPara="1" rIns="91425" wrap="square" tIns="91425">
+            <a:spAutoFit/>
+          </a:bodyPr>
+          <a:lstStyle/>
+          <a:p>
+            <a:pPr indent="0" lvl="0" marL="0" rtl="0" algn="l">
+              <a:spcBef>
+                <a:spcPts val="0"/>
+              </a:spcBef>
+              <a:spcAft>
+                <a:spcPts val="0"/>
+              </a:spcAft>
+              <a:buNone/>
+            </a:pPr>
+            <a:r>
+              <a:rPr lang="es-CO" sz="1800">
+                <a:latin typeface="Rockwell"/>
+                <a:ea typeface="Rockwell"/>
+                <a:cs typeface="Rockwell"/>
+                <a:sym typeface="Rockwell"/>
+              </a:rPr>
+              <a:t>P(0) Caso Relativista</a:t>
+            </a:r>
+            <a:endParaRPr sz="1800">
+              <a:latin typeface="Rockwell"/>
+              <a:ea typeface="Rockwell"/>
+              <a:cs typeface="Rockwell"/>
+              <a:sym typeface="Rockwell"/>
+            </a:endParaRPr>
+          </a:p>
+          <a:p>
+            <a:pPr indent="0" lvl="0" marL="0" rtl="0" algn="l">
+              <a:spcBef>
+                <a:spcPts val="0"/>
+              </a:spcBef>
+              <a:spcAft>
+                <a:spcPts val="0"/>
+              </a:spcAft>
+              <a:buNone/>
+            </a:pPr>
+            <a:r>
+              <a:rPr lang="es-CO" sz="1800">
+                <a:latin typeface="Rockwell"/>
+                <a:ea typeface="Rockwell"/>
+                <a:cs typeface="Rockwell"/>
+                <a:sym typeface="Rockwell"/>
+              </a:rPr>
+              <a:t>r = 0.7</a:t>
+            </a:r>
+            <a:endParaRPr sz="1800">
+              <a:latin typeface="Rockwell"/>
+              <a:ea typeface="Rockwell"/>
+              <a:cs typeface="Rockwell"/>
+              <a:sym typeface="Rockwell"/>
+            </a:endParaRPr>
+          </a:p>
+          <a:p>
+            <a:pPr indent="0" lvl="0" marL="0" rtl="0" algn="l">
+              <a:spcBef>
+                <a:spcPts val="0"/>
+              </a:spcBef>
+              <a:spcAft>
+                <a:spcPts val="0"/>
+              </a:spcAft>
+              <a:buNone/>
+            </a:pPr>
+            <a:r>
+              <a:rPr lang="es-CO" sz="1800">
+                <a:latin typeface="Rockwell"/>
+                <a:ea typeface="Rockwell"/>
+                <a:cs typeface="Rockwell"/>
+                <a:sym typeface="Rockwell"/>
+              </a:rPr>
+              <a:t>m = 0.7</a:t>
+            </a:r>
+            <a:endParaRPr sz="1800">
+              <a:latin typeface="Rockwell"/>
+              <a:ea typeface="Rockwell"/>
+              <a:cs typeface="Rockwell"/>
+              <a:sym typeface="Rockwell"/>
+            </a:endParaRPr>
+          </a:p>
+        </p:txBody>
+      </p:sp>
     </p:spTree>
   </p:cSld>
   <p:clrMapOvr>
@@ -19017,12 +20687,12 @@
 </p:sld>
 </file>
 
-<file path=ppt/slides/slide6.xml><?xml version="1.0" encoding="utf-8"?>
+<file path=ppt/slides/slide8.xml><?xml version="1.0" encoding="utf-8"?>
 <p:sld xmlns:a="http://schemas.openxmlformats.org/drawingml/2006/main" xmlns:r="http://schemas.openxmlformats.org/officeDocument/2006/relationships" xmlns:mc="http://schemas.openxmlformats.org/markup-compatibility/2006" xmlns:mv="urn:schemas-microsoft-com:mac:vml" xmlns:p="http://schemas.openxmlformats.org/presentationml/2006/main" xmlns:c="http://schemas.openxmlformats.org/drawingml/2006/chart" xmlns:dgm="http://schemas.openxmlformats.org/drawingml/2006/diagram" xmlns:o="urn:schemas-microsoft-com:office:office" xmlns:v="urn:schemas-microsoft-com:vml" xmlns:pvml="urn:schemas-microsoft-com:office:powerpoint" xmlns:com="http://schemas.openxmlformats.org/drawingml/2006/compatibility" xmlns:p14="http://schemas.microsoft.com/office/powerpoint/2010/main" xmlns:p15="http://schemas.microsoft.com/office/powerpoint/2012/main" xmlns:ahyp="http://schemas.microsoft.com/office/drawing/2018/hyperlinkcolor">
   <p:cSld>
     <p:spTree>
       <p:nvGrpSpPr>
-        <p:cNvPr id="158" name="Shape 158"/>
+        <p:cNvPr id="181" name="Shape 181"/>
         <p:cNvGrpSpPr/>
         <p:nvPr/>
       </p:nvGrpSpPr>
@@ -19036,7 +20706,7 @@
       </p:grpSpPr>
       <p:sp>
         <p:nvSpPr>
-          <p:cNvPr id="159" name="Google Shape;159;g104ffd182bf_0_16"/>
+          <p:cNvPr id="182" name="Google Shape;182;g104ffd182bf_0_16"/>
           <p:cNvSpPr txBox="1"/>
           <p:nvPr>
             <p:ph type="title"/>
@@ -19085,7 +20755,7 @@
       </p:sp>
       <p:sp>
         <p:nvSpPr>
-          <p:cNvPr id="160" name="Google Shape;160;g104ffd182bf_0_16"/>
+          <p:cNvPr id="183" name="Google Shape;183;g104ffd182bf_0_16"/>
           <p:cNvSpPr txBox="1"/>
           <p:nvPr/>
         </p:nvSpPr>
@@ -19155,7 +20825,7 @@
       </p:sp>
       <p:pic>
         <p:nvPicPr>
-          <p:cNvPr id="161" name="Google Shape;161;g104ffd182bf_0_16"/>
+          <p:cNvPr id="184" name="Google Shape;184;g104ffd182bf_0_16"/>
           <p:cNvPicPr preferRelativeResize="0"/>
           <p:nvPr/>
         </p:nvPicPr>
@@ -19183,7 +20853,7 @@
       </p:pic>
       <p:pic>
         <p:nvPicPr>
-          <p:cNvPr id="162" name="Google Shape;162;g104ffd182bf_0_16"/>
+          <p:cNvPr id="185" name="Google Shape;185;g104ffd182bf_0_16"/>
           <p:cNvPicPr preferRelativeResize="0"/>
           <p:nvPr/>
         </p:nvPicPr>
@@ -19210,7 +20880,7 @@
       </p:pic>
       <p:sp>
         <p:nvSpPr>
-          <p:cNvPr id="163" name="Google Shape;163;g104ffd182bf_0_16"/>
+          <p:cNvPr id="186" name="Google Shape;186;g104ffd182bf_0_16"/>
           <p:cNvSpPr txBox="1"/>
           <p:nvPr/>
         </p:nvSpPr>
@@ -19280,7 +20950,7 @@
       </p:sp>
       <p:sp>
         <p:nvSpPr>
-          <p:cNvPr id="164" name="Google Shape;164;g104ffd182bf_0_16"/>
+          <p:cNvPr id="187" name="Google Shape;187;g104ffd182bf_0_16"/>
           <p:cNvSpPr txBox="1"/>
           <p:nvPr/>
         </p:nvSpPr>
@@ -19350,12 +21020,12 @@
 </p:sld>
 </file>
 
-<file path=ppt/slides/slide7.xml><?xml version="1.0" encoding="utf-8"?>
+<file path=ppt/slides/slide9.xml><?xml version="1.0" encoding="utf-8"?>
 <p:sld xmlns:a="http://schemas.openxmlformats.org/drawingml/2006/main" xmlns:r="http://schemas.openxmlformats.org/officeDocument/2006/relationships" xmlns:mc="http://schemas.openxmlformats.org/markup-compatibility/2006" xmlns:mv="urn:schemas-microsoft-com:mac:vml" xmlns:p="http://schemas.openxmlformats.org/presentationml/2006/main" xmlns:c="http://schemas.openxmlformats.org/drawingml/2006/chart" xmlns:dgm="http://schemas.openxmlformats.org/drawingml/2006/diagram" xmlns:o="urn:schemas-microsoft-com:office:office" xmlns:v="urn:schemas-microsoft-com:vml" xmlns:pvml="urn:schemas-microsoft-com:office:powerpoint" xmlns:com="http://schemas.openxmlformats.org/drawingml/2006/compatibility" xmlns:p14="http://schemas.microsoft.com/office/powerpoint/2010/main" xmlns:p15="http://schemas.microsoft.com/office/powerpoint/2012/main" xmlns:ahyp="http://schemas.microsoft.com/office/drawing/2018/hyperlinkcolor">
   <p:cSld>
     <p:spTree>
       <p:nvGrpSpPr>
-        <p:cNvPr id="168" name="Shape 168"/>
+        <p:cNvPr id="191" name="Shape 191"/>
         <p:cNvGrpSpPr/>
         <p:nvPr/>
       </p:nvGrpSpPr>
@@ -19369,7 +21039,7 @@
       </p:grpSpPr>
       <p:sp>
         <p:nvSpPr>
-          <p:cNvPr id="169" name="Google Shape;169;g104ffd182bf_0_27"/>
+          <p:cNvPr id="192" name="Google Shape;192;g104ffd182bf_0_27"/>
           <p:cNvSpPr txBox="1"/>
           <p:nvPr>
             <p:ph type="title"/>
@@ -19418,7 +21088,7 @@
       </p:sp>
       <p:sp>
         <p:nvSpPr>
-          <p:cNvPr id="170" name="Google Shape;170;g104ffd182bf_0_27"/>
+          <p:cNvPr id="193" name="Google Shape;193;g104ffd182bf_0_27"/>
           <p:cNvSpPr txBox="1"/>
           <p:nvPr/>
         </p:nvSpPr>
@@ -19470,7 +21140,7 @@
       </p:sp>
       <p:sp>
         <p:nvSpPr>
-          <p:cNvPr id="171" name="Google Shape;171;g104ffd182bf_0_27"/>
+          <p:cNvPr id="194" name="Google Shape;194;g104ffd182bf_0_27"/>
           <p:cNvSpPr txBox="1"/>
           <p:nvPr/>
         </p:nvSpPr>
@@ -19540,7 +21210,7 @@
       </p:sp>
       <p:sp>
         <p:nvSpPr>
-          <p:cNvPr id="172" name="Google Shape;172;g104ffd182bf_0_27"/>
+          <p:cNvPr id="195" name="Google Shape;195;g104ffd182bf_0_27"/>
           <p:cNvSpPr txBox="1"/>
           <p:nvPr/>
         </p:nvSpPr>
@@ -19604,7 +21274,7 @@
       </p:sp>
       <p:pic>
         <p:nvPicPr>
-          <p:cNvPr id="173" name="Google Shape;173;g104ffd182bf_0_27"/>
+          <p:cNvPr id="196" name="Google Shape;196;g104ffd182bf_0_27"/>
           <p:cNvPicPr preferRelativeResize="0"/>
           <p:nvPr/>
         </p:nvPicPr>
@@ -19631,7 +21301,7 @@
       </p:pic>
       <p:pic>
         <p:nvPicPr>
-          <p:cNvPr id="174" name="Google Shape;174;g104ffd182bf_0_27"/>
+          <p:cNvPr id="197" name="Google Shape;197;g104ffd182bf_0_27"/>
           <p:cNvPicPr preferRelativeResize="0"/>
           <p:nvPr/>
         </p:nvPicPr>
@@ -19665,639 +21335,286 @@
 </p:sld>
 </file>
 
-<file path=ppt/slides/slide8.xml><?xml version="1.0" encoding="utf-8"?>
-<p:sld xmlns:a="http://schemas.openxmlformats.org/drawingml/2006/main" xmlns:r="http://schemas.openxmlformats.org/officeDocument/2006/relationships" xmlns:mc="http://schemas.openxmlformats.org/markup-compatibility/2006" xmlns:mv="urn:schemas-microsoft-com:mac:vml" xmlns:p="http://schemas.openxmlformats.org/presentationml/2006/main" xmlns:c="http://schemas.openxmlformats.org/drawingml/2006/chart" xmlns:dgm="http://schemas.openxmlformats.org/drawingml/2006/diagram" xmlns:o="urn:schemas-microsoft-com:office:office" xmlns:v="urn:schemas-microsoft-com:vml" xmlns:pvml="urn:schemas-microsoft-com:office:powerpoint" xmlns:com="http://schemas.openxmlformats.org/drawingml/2006/compatibility" xmlns:p14="http://schemas.microsoft.com/office/powerpoint/2010/main" xmlns:p15="http://schemas.microsoft.com/office/powerpoint/2012/main" xmlns:ahyp="http://schemas.microsoft.com/office/drawing/2018/hyperlinkcolor">
-  <p:cSld>
-    <p:spTree>
-      <p:nvGrpSpPr>
-        <p:cNvPr id="178" name="Shape 178"/>
-        <p:cNvGrpSpPr/>
-        <p:nvPr/>
-      </p:nvGrpSpPr>
-      <p:grpSpPr>
-        <a:xfrm>
-          <a:off x="0" y="0"/>
-          <a:ext cx="0" cy="0"/>
-          <a:chOff x="0" y="0"/>
-          <a:chExt cx="0" cy="0"/>
-        </a:xfrm>
-      </p:grpSpPr>
-      <p:sp>
-        <p:nvSpPr>
-          <p:cNvPr id="179" name="Google Shape;179;g104ffd182bf_0_36"/>
-          <p:cNvSpPr txBox="1"/>
-          <p:nvPr>
-            <p:ph type="title"/>
-          </p:nvPr>
-        </p:nvSpPr>
-        <p:spPr>
-          <a:xfrm>
-            <a:off x="1066798" y="7"/>
-            <a:ext cx="10058400" cy="1056000"/>
-          </a:xfrm>
-          <a:prstGeom prst="rect">
-            <a:avLst/>
-          </a:prstGeom>
-          <a:noFill/>
-          <a:ln>
-            <a:noFill/>
-          </a:ln>
-        </p:spPr>
-        <p:txBody>
-          <a:bodyPr anchorCtr="0" anchor="ctr" bIns="45700" lIns="91425" spcFirstLastPara="1" rIns="91425" wrap="square" tIns="45700">
-            <a:normAutofit/>
-          </a:bodyPr>
-          <a:lstStyle/>
-          <a:p>
-            <a:pPr indent="0" lvl="0" marL="0" rtl="0" algn="ctr">
-              <a:lnSpc>
-                <a:spcPct val="90000"/>
-              </a:lnSpc>
-              <a:spcBef>
-                <a:spcPts val="0"/>
-              </a:spcBef>
-              <a:spcAft>
-                <a:spcPts val="0"/>
-              </a:spcAft>
-              <a:buSzPts val="5400"/>
-              <a:buFont typeface="Rockwell"/>
-              <a:buNone/>
-            </a:pPr>
-            <a:r>
-              <a:rPr lang="es-CO"/>
-              <a:t>RESULTADOS</a:t>
-            </a:r>
-            <a:endParaRPr/>
-          </a:p>
-        </p:txBody>
-      </p:sp>
-      <p:sp>
-        <p:nvSpPr>
-          <p:cNvPr id="180" name="Google Shape;180;g104ffd182bf_0_36"/>
-          <p:cNvSpPr txBox="1"/>
-          <p:nvPr/>
-        </p:nvSpPr>
-        <p:spPr>
-          <a:xfrm>
-            <a:off x="1199250" y="1056000"/>
-            <a:ext cx="9793500" cy="492600"/>
-          </a:xfrm>
-          <a:prstGeom prst="rect">
-            <a:avLst/>
-          </a:prstGeom>
-          <a:noFill/>
-          <a:ln>
-            <a:noFill/>
-          </a:ln>
-        </p:spPr>
-        <p:txBody>
-          <a:bodyPr anchorCtr="0" anchor="t" bIns="91425" lIns="91425" spcFirstLastPara="1" rIns="91425" wrap="square" tIns="91425">
-            <a:spAutoFit/>
-          </a:bodyPr>
-          <a:lstStyle/>
-          <a:p>
-            <a:pPr indent="0" lvl="0" marL="0" rtl="0" algn="ctr">
-              <a:spcBef>
-                <a:spcPts val="0"/>
-              </a:spcBef>
-              <a:spcAft>
-                <a:spcPts val="0"/>
-              </a:spcAft>
-              <a:buNone/>
-            </a:pPr>
-            <a:r>
-              <a:rPr lang="es-CO" sz="2000">
-                <a:latin typeface="Rockwell"/>
-                <a:ea typeface="Rockwell"/>
-                <a:cs typeface="Rockwell"/>
-                <a:sym typeface="Rockwell"/>
-              </a:rPr>
-              <a:t>Análisis de sensibilidad parámetro η  [0.2, 0.5 0.8 1.1 1.4].</a:t>
-            </a:r>
-            <a:endParaRPr sz="2000">
-              <a:latin typeface="Rockwell"/>
-              <a:ea typeface="Rockwell"/>
-              <a:cs typeface="Rockwell"/>
-              <a:sym typeface="Rockwell"/>
-            </a:endParaRPr>
-          </a:p>
-        </p:txBody>
-      </p:sp>
-      <p:sp>
-        <p:nvSpPr>
-          <p:cNvPr id="181" name="Google Shape;181;g104ffd182bf_0_36"/>
-          <p:cNvSpPr txBox="1"/>
-          <p:nvPr/>
-        </p:nvSpPr>
-        <p:spPr>
-          <a:xfrm>
-            <a:off x="872350" y="1752025"/>
-            <a:ext cx="4251000" cy="400200"/>
-          </a:xfrm>
-          <a:prstGeom prst="rect">
-            <a:avLst/>
-          </a:prstGeom>
-          <a:noFill/>
-          <a:ln cap="flat" cmpd="sng" w="9525">
-            <a:solidFill>
-              <a:srgbClr val="FF0000"/>
-            </a:solidFill>
-            <a:prstDash val="solid"/>
-            <a:round/>
-            <a:headEnd len="sm" w="sm" type="none"/>
-            <a:tailEnd len="sm" w="sm" type="none"/>
-          </a:ln>
-        </p:spPr>
-        <p:txBody>
-          <a:bodyPr anchorCtr="0" anchor="t" bIns="91425" lIns="91425" spcFirstLastPara="1" rIns="91425" wrap="square" tIns="91425">
-            <a:spAutoFit/>
-          </a:bodyPr>
-          <a:lstStyle/>
-          <a:p>
-            <a:pPr indent="0" lvl="0" marL="0" rtl="0" algn="ctr">
-              <a:spcBef>
-                <a:spcPts val="0"/>
-              </a:spcBef>
-              <a:spcAft>
-                <a:spcPts val="0"/>
-              </a:spcAft>
-              <a:buNone/>
-            </a:pPr>
-            <a:r>
-              <a:rPr lang="es-CO">
-                <a:solidFill>
-                  <a:srgbClr val="FF0000"/>
-                </a:solidFill>
-                <a:latin typeface="Rockwell"/>
-                <a:ea typeface="Rockwell"/>
-                <a:cs typeface="Rockwell"/>
-                <a:sym typeface="Rockwell"/>
-              </a:rPr>
-              <a:t>Modelo Newtoniano</a:t>
-            </a:r>
-            <a:r>
-              <a:rPr lang="es-CO">
-                <a:latin typeface="Rockwell"/>
-                <a:ea typeface="Rockwell"/>
-                <a:cs typeface="Rockwell"/>
-                <a:sym typeface="Rockwell"/>
-              </a:rPr>
-              <a:t> </a:t>
-            </a:r>
-            <a:endParaRPr>
-              <a:latin typeface="Rockwell"/>
-              <a:ea typeface="Rockwell"/>
-              <a:cs typeface="Rockwell"/>
-              <a:sym typeface="Rockwell"/>
-            </a:endParaRPr>
-          </a:p>
-        </p:txBody>
-      </p:sp>
-      <p:sp>
-        <p:nvSpPr>
-          <p:cNvPr id="182" name="Google Shape;182;g104ffd182bf_0_36"/>
-          <p:cNvSpPr txBox="1"/>
-          <p:nvPr/>
-        </p:nvSpPr>
-        <p:spPr>
-          <a:xfrm>
-            <a:off x="7068650" y="1752125"/>
-            <a:ext cx="4251000" cy="400200"/>
-          </a:xfrm>
-          <a:prstGeom prst="rect">
-            <a:avLst/>
-          </a:prstGeom>
-          <a:noFill/>
-          <a:ln cap="flat" cmpd="sng" w="9525">
-            <a:solidFill>
-              <a:srgbClr val="0000FF"/>
-            </a:solidFill>
-            <a:prstDash val="solid"/>
-            <a:round/>
-            <a:headEnd len="sm" w="sm" type="none"/>
-            <a:tailEnd len="sm" w="sm" type="none"/>
-          </a:ln>
-        </p:spPr>
-        <p:txBody>
-          <a:bodyPr anchorCtr="0" anchor="t" bIns="91425" lIns="91425" spcFirstLastPara="1" rIns="91425" wrap="square" tIns="91425">
-            <a:spAutoFit/>
-          </a:bodyPr>
-          <a:lstStyle/>
-          <a:p>
-            <a:pPr indent="0" lvl="0" marL="0" rtl="0" algn="ctr">
-              <a:spcBef>
-                <a:spcPts val="0"/>
-              </a:spcBef>
-              <a:spcAft>
-                <a:spcPts val="0"/>
-              </a:spcAft>
-              <a:buNone/>
-            </a:pPr>
-            <a:r>
-              <a:rPr lang="es-CO">
-                <a:solidFill>
-                  <a:srgbClr val="0000FF"/>
-                </a:solidFill>
-                <a:latin typeface="Rockwell"/>
-                <a:ea typeface="Rockwell"/>
-                <a:cs typeface="Rockwell"/>
-                <a:sym typeface="Rockwell"/>
-              </a:rPr>
-              <a:t>Modelo Relativista </a:t>
-            </a:r>
-            <a:endParaRPr>
-              <a:solidFill>
-                <a:srgbClr val="0000FF"/>
-              </a:solidFill>
-              <a:latin typeface="Rockwell"/>
-              <a:ea typeface="Rockwell"/>
-              <a:cs typeface="Rockwell"/>
-              <a:sym typeface="Rockwell"/>
-            </a:endParaRPr>
-          </a:p>
-        </p:txBody>
-      </p:sp>
-      <p:pic>
-        <p:nvPicPr>
-          <p:cNvPr id="183" name="Google Shape;183;g104ffd182bf_0_36"/>
-          <p:cNvPicPr preferRelativeResize="0"/>
-          <p:nvPr/>
-        </p:nvPicPr>
-        <p:blipFill>
-          <a:blip r:embed="rId3">
-            <a:alphaModFix/>
-          </a:blip>
-          <a:stretch>
-            <a:fillRect/>
-          </a:stretch>
-        </p:blipFill>
-        <p:spPr>
-          <a:xfrm>
-            <a:off x="98975" y="2462600"/>
-            <a:ext cx="5797750" cy="3350124"/>
-          </a:xfrm>
-          <a:prstGeom prst="rect">
-            <a:avLst/>
-          </a:prstGeom>
-          <a:noFill/>
-          <a:ln>
-            <a:noFill/>
-          </a:ln>
-        </p:spPr>
-      </p:pic>
-      <p:pic>
-        <p:nvPicPr>
-          <p:cNvPr id="184" name="Google Shape;184;g104ffd182bf_0_36"/>
-          <p:cNvPicPr preferRelativeResize="0"/>
-          <p:nvPr/>
-        </p:nvPicPr>
-        <p:blipFill>
-          <a:blip r:embed="rId4">
-            <a:alphaModFix/>
-          </a:blip>
-          <a:stretch>
-            <a:fillRect/>
-          </a:stretch>
-        </p:blipFill>
-        <p:spPr>
-          <a:xfrm>
-            <a:off x="6078078" y="2355850"/>
-            <a:ext cx="6113921" cy="3437850"/>
-          </a:xfrm>
-          <a:prstGeom prst="rect">
-            <a:avLst/>
-          </a:prstGeom>
-          <a:noFill/>
-          <a:ln>
-            <a:noFill/>
-          </a:ln>
-        </p:spPr>
-      </p:pic>
-    </p:spTree>
-  </p:cSld>
-  <p:clrMapOvr>
-    <a:masterClrMapping/>
-  </p:clrMapOvr>
-</p:sld>
+<file path=ppt/theme/theme1.xml><?xml version="1.0" encoding="utf-8"?>
+<a:theme xmlns:a="http://schemas.openxmlformats.org/drawingml/2006/main" xmlns:r="http://schemas.openxmlformats.org/officeDocument/2006/relationships">
+  <a:themeElements>
+    <a:clrScheme name="Default">
+      <a:dk1>
+        <a:srgbClr val="000000"/>
+      </a:dk1>
+      <a:lt1>
+        <a:srgbClr val="FFFFFF"/>
+      </a:lt1>
+      <a:dk2>
+        <a:srgbClr val="158158"/>
+      </a:dk2>
+      <a:lt2>
+        <a:srgbClr val="F3F3F3"/>
+      </a:lt2>
+      <a:accent1>
+        <a:srgbClr val="058DC7"/>
+      </a:accent1>
+      <a:accent2>
+        <a:srgbClr val="50B432"/>
+      </a:accent2>
+      <a:accent3>
+        <a:srgbClr val="ED561B"/>
+      </a:accent3>
+      <a:accent4>
+        <a:srgbClr val="EDEF00"/>
+      </a:accent4>
+      <a:accent5>
+        <a:srgbClr val="24CBE5"/>
+      </a:accent5>
+      <a:accent6>
+        <a:srgbClr val="64E572"/>
+      </a:accent6>
+      <a:hlink>
+        <a:srgbClr val="2200CC"/>
+      </a:hlink>
+      <a:folHlink>
+        <a:srgbClr val="551A8B"/>
+      </a:folHlink>
+    </a:clrScheme>
+    <a:fontScheme name="Office">
+      <a:majorFont>
+        <a:latin typeface="Arial"/>
+        <a:ea typeface=""/>
+        <a:cs typeface=""/>
+        <a:font script="Jpan" typeface="ＭＳ Ｐゴシック"/>
+        <a:font script="Hang" typeface="맑은 고딕"/>
+        <a:font script="Hans" typeface="宋体"/>
+        <a:font script="Hant" typeface="新細明體"/>
+        <a:font script="Arab" typeface="Times New Roman"/>
+        <a:font script="Hebr" typeface="Times New Roman"/>
+        <a:font script="Thai" typeface="Angsana New"/>
+        <a:font script="Ethi" typeface="Nyala"/>
+        <a:font script="Beng" typeface="Vrinda"/>
+        <a:font script="Gujr" typeface="Shruti"/>
+        <a:font script="Khmr" typeface="MoolBoran"/>
+        <a:font script="Knda" typeface="Tunga"/>
+        <a:font script="Guru" typeface="Raavi"/>
+        <a:font script="Cans" typeface="Euphemia"/>
+        <a:font script="Cher" typeface="Plantagenet Cherokee"/>
+        <a:font script="Yiii" typeface="Microsoft Yi Baiti"/>
+        <a:font script="Tibt" typeface="Microsoft Himalaya"/>
+        <a:font script="Thaa" typeface="MV Boli"/>
+        <a:font script="Deva" typeface="Mangal"/>
+        <a:font script="Telu" typeface="Gautami"/>
+        <a:font script="Taml" typeface="Latha"/>
+        <a:font script="Syrc" typeface="Estrangelo Edessa"/>
+        <a:font script="Orya" typeface="Kalinga"/>
+        <a:font script="Mlym" typeface="Kartika"/>
+        <a:font script="Laoo" typeface="DokChampa"/>
+        <a:font script="Sinh" typeface="Iskoola Pota"/>
+        <a:font script="Mong" typeface="Mongolian Baiti"/>
+        <a:font script="Viet" typeface="Times New Roman"/>
+        <a:font script="Uigh" typeface="Microsoft Uighur"/>
+        <a:font script="Geor" typeface="Sylfaen"/>
+      </a:majorFont>
+      <a:minorFont>
+        <a:latin typeface="Arial"/>
+        <a:ea typeface=""/>
+        <a:cs typeface=""/>
+        <a:font script="Jpan" typeface="ＭＳ Ｐゴシック"/>
+        <a:font script="Hang" typeface="맑은 고딕"/>
+        <a:font script="Hans" typeface="宋体"/>
+        <a:font script="Hant" typeface="新細明體"/>
+        <a:font script="Arab" typeface="Arial"/>
+        <a:font script="Hebr" typeface="Arial"/>
+        <a:font script="Thai" typeface="Cordia New"/>
+        <a:font script="Ethi" typeface="Nyala"/>
+        <a:font script="Beng" typeface="Vrinda"/>
+        <a:font script="Gujr" typeface="Shruti"/>
+        <a:font script="Khmr" typeface="DaunPenh"/>
+        <a:font script="Knda" typeface="Tunga"/>
+        <a:font script="Guru" typeface="Raavi"/>
+        <a:font script="Cans" typeface="Euphemia"/>
+        <a:font script="Cher" typeface="Plantagenet Cherokee"/>
+        <a:font script="Yiii" typeface="Microsoft Yi Baiti"/>
+        <a:font script="Tibt" typeface="Microsoft Himalaya"/>
+        <a:font script="Thaa" typeface="MV Boli"/>
+        <a:font script="Deva" typeface="Mangal"/>
+        <a:font script="Telu" typeface="Gautami"/>
+        <a:font script="Taml" typeface="Latha"/>
+        <a:font script="Syrc" typeface="Estrangelo Edessa"/>
+        <a:font script="Orya" typeface="Kalinga"/>
+        <a:font script="Mlym" typeface="Kartika"/>
+        <a:font script="Laoo" typeface="DokChampa"/>
+        <a:font script="Sinh" typeface="Iskoola Pota"/>
+        <a:font script="Mong" typeface="Mongolian Baiti"/>
+        <a:font script="Viet" typeface="Arial"/>
+        <a:font script="Uigh" typeface="Microsoft Uighur"/>
+        <a:font script="Geor" typeface="Sylfaen"/>
+      </a:minorFont>
+    </a:fontScheme>
+    <a:fmtScheme name="Office">
+      <a:fillStyleLst>
+        <a:solidFill>
+          <a:schemeClr val="phClr"/>
+        </a:solidFill>
+        <a:gradFill rotWithShape="1">
+          <a:gsLst>
+            <a:gs pos="0">
+              <a:schemeClr val="phClr">
+                <a:tint val="50000"/>
+                <a:satMod val="300000"/>
+              </a:schemeClr>
+            </a:gs>
+            <a:gs pos="35000">
+              <a:schemeClr val="phClr">
+                <a:tint val="37000"/>
+                <a:satMod val="300000"/>
+              </a:schemeClr>
+            </a:gs>
+            <a:gs pos="100000">
+              <a:schemeClr val="phClr">
+                <a:tint val="15000"/>
+                <a:satMod val="350000"/>
+              </a:schemeClr>
+            </a:gs>
+          </a:gsLst>
+          <a:lin ang="16200000" scaled="1"/>
+        </a:gradFill>
+        <a:gradFill rotWithShape="1">
+          <a:gsLst>
+            <a:gs pos="0">
+              <a:schemeClr val="phClr">
+                <a:tint val="100000"/>
+                <a:shade val="100000"/>
+                <a:satMod val="130000"/>
+              </a:schemeClr>
+            </a:gs>
+            <a:gs pos="100000">
+              <a:schemeClr val="phClr">
+                <a:tint val="50000"/>
+                <a:shade val="100000"/>
+                <a:satMod val="350000"/>
+              </a:schemeClr>
+            </a:gs>
+          </a:gsLst>
+          <a:lin ang="16200000" scaled="0"/>
+        </a:gradFill>
+      </a:fillStyleLst>
+      <a:lnStyleLst>
+        <a:ln w="9525" cap="flat" cmpd="sng" algn="ctr">
+          <a:solidFill>
+            <a:schemeClr val="phClr">
+              <a:shade val="95000"/>
+              <a:satMod val="105000"/>
+            </a:schemeClr>
+          </a:solidFill>
+          <a:prstDash val="solid"/>
+        </a:ln>
+        <a:ln w="25400" cap="flat" cmpd="sng" algn="ctr">
+          <a:solidFill>
+            <a:schemeClr val="phClr"/>
+          </a:solidFill>
+          <a:prstDash val="solid"/>
+        </a:ln>
+        <a:ln w="38100" cap="flat" cmpd="sng" algn="ctr">
+          <a:solidFill>
+            <a:schemeClr val="phClr"/>
+          </a:solidFill>
+          <a:prstDash val="solid"/>
+        </a:ln>
+      </a:lnStyleLst>
+      <a:effectStyleLst>
+        <a:effectStyle>
+          <a:effectLst>
+            <a:outerShdw blurRad="40000" dist="20000" dir="5400000" rotWithShape="0">
+              <a:srgbClr val="000000">
+                <a:alpha val="38000"/>
+              </a:srgbClr>
+            </a:outerShdw>
+          </a:effectLst>
+        </a:effectStyle>
+        <a:effectStyle>
+          <a:effectLst>
+            <a:outerShdw blurRad="40000" dist="23000" dir="5400000" rotWithShape="0">
+              <a:srgbClr val="000000">
+                <a:alpha val="35000"/>
+              </a:srgbClr>
+            </a:outerShdw>
+          </a:effectLst>
+        </a:effectStyle>
+        <a:effectStyle>
+          <a:effectLst>
+            <a:outerShdw blurRad="40000" dist="23000" dir="5400000" rotWithShape="0">
+              <a:srgbClr val="000000">
+                <a:alpha val="35000"/>
+              </a:srgbClr>
+            </a:outerShdw>
+          </a:effectLst>
+          <a:scene3d>
+            <a:camera prst="orthographicFront">
+              <a:rot lat="0" lon="0" rev="0"/>
+            </a:camera>
+            <a:lightRig rig="threePt" dir="t">
+              <a:rot lat="0" lon="0" rev="1200000"/>
+            </a:lightRig>
+          </a:scene3d>
+          <a:sp3d>
+            <a:bevelT w="63500" h="25400"/>
+          </a:sp3d>
+        </a:effectStyle>
+      </a:effectStyleLst>
+      <a:bgFillStyleLst>
+        <a:solidFill>
+          <a:schemeClr val="phClr"/>
+        </a:solidFill>
+        <a:gradFill rotWithShape="1">
+          <a:gsLst>
+            <a:gs pos="0">
+              <a:schemeClr val="phClr">
+                <a:tint val="40000"/>
+                <a:satMod val="350000"/>
+              </a:schemeClr>
+            </a:gs>
+            <a:gs pos="40000">
+              <a:schemeClr val="phClr">
+                <a:tint val="45000"/>
+                <a:shade val="99000"/>
+                <a:satMod val="350000"/>
+              </a:schemeClr>
+            </a:gs>
+            <a:gs pos="100000">
+              <a:schemeClr val="phClr">
+                <a:shade val="20000"/>
+                <a:satMod val="255000"/>
+              </a:schemeClr>
+            </a:gs>
+          </a:gsLst>
+          <a:path path="circle">
+            <a:fillToRect l="50000" t="-80000" r="50000" b="180000"/>
+          </a:path>
+        </a:gradFill>
+        <a:gradFill rotWithShape="1">
+          <a:gsLst>
+            <a:gs pos="0">
+              <a:schemeClr val="phClr">
+                <a:tint val="80000"/>
+                <a:satMod val="300000"/>
+              </a:schemeClr>
+            </a:gs>
+            <a:gs pos="100000">
+              <a:schemeClr val="phClr">
+                <a:shade val="30000"/>
+                <a:satMod val="200000"/>
+              </a:schemeClr>
+            </a:gs>
+          </a:gsLst>
+          <a:path path="circle">
+            <a:fillToRect l="50000" t="50000" r="50000" b="50000"/>
+          </a:path>
+        </a:gradFill>
+      </a:bgFillStyleLst>
+    </a:fmtScheme>
+  </a:themeElements>
+</a:theme>
 </file>
 
-<file path=ppt/slides/slide9.xml><?xml version="1.0" encoding="utf-8"?>
-<p:sld xmlns:a="http://schemas.openxmlformats.org/drawingml/2006/main" xmlns:r="http://schemas.openxmlformats.org/officeDocument/2006/relationships" xmlns:mc="http://schemas.openxmlformats.org/markup-compatibility/2006" xmlns:mv="urn:schemas-microsoft-com:mac:vml" xmlns:p="http://schemas.openxmlformats.org/presentationml/2006/main" xmlns:c="http://schemas.openxmlformats.org/drawingml/2006/chart" xmlns:dgm="http://schemas.openxmlformats.org/drawingml/2006/diagram" xmlns:o="urn:schemas-microsoft-com:office:office" xmlns:v="urn:schemas-microsoft-com:vml" xmlns:pvml="urn:schemas-microsoft-com:office:powerpoint" xmlns:com="http://schemas.openxmlformats.org/drawingml/2006/compatibility" xmlns:p14="http://schemas.microsoft.com/office/powerpoint/2010/main" xmlns:p15="http://schemas.microsoft.com/office/powerpoint/2012/main" xmlns:ahyp="http://schemas.microsoft.com/office/drawing/2018/hyperlinkcolor">
-  <p:cSld>
-    <p:spTree>
-      <p:nvGrpSpPr>
-        <p:cNvPr id="188" name="Shape 188"/>
-        <p:cNvGrpSpPr/>
-        <p:nvPr/>
-      </p:nvGrpSpPr>
-      <p:grpSpPr>
-        <a:xfrm>
-          <a:off x="0" y="0"/>
-          <a:ext cx="0" cy="0"/>
-          <a:chOff x="0" y="0"/>
-          <a:chExt cx="0" cy="0"/>
-        </a:xfrm>
-      </p:grpSpPr>
-      <p:sp>
-        <p:nvSpPr>
-          <p:cNvPr id="189" name="Google Shape;189;g104ffd182bf_0_43"/>
-          <p:cNvSpPr txBox="1"/>
-          <p:nvPr>
-            <p:ph type="title"/>
-          </p:nvPr>
-        </p:nvSpPr>
-        <p:spPr>
-          <a:xfrm>
-            <a:off x="1066798" y="7"/>
-            <a:ext cx="10058400" cy="1056000"/>
-          </a:xfrm>
-          <a:prstGeom prst="rect">
-            <a:avLst/>
-          </a:prstGeom>
-          <a:noFill/>
-          <a:ln>
-            <a:noFill/>
-          </a:ln>
-        </p:spPr>
-        <p:txBody>
-          <a:bodyPr anchorCtr="0" anchor="ctr" bIns="45700" lIns="91425" spcFirstLastPara="1" rIns="91425" wrap="square" tIns="45700">
-            <a:normAutofit/>
-          </a:bodyPr>
-          <a:lstStyle/>
-          <a:p>
-            <a:pPr indent="0" lvl="0" marL="0" rtl="0" algn="ctr">
-              <a:lnSpc>
-                <a:spcPct val="90000"/>
-              </a:lnSpc>
-              <a:spcBef>
-                <a:spcPts val="0"/>
-              </a:spcBef>
-              <a:spcAft>
-                <a:spcPts val="0"/>
-              </a:spcAft>
-              <a:buSzPts val="5400"/>
-              <a:buFont typeface="Rockwell"/>
-              <a:buNone/>
-            </a:pPr>
-            <a:r>
-              <a:rPr lang="es-CO"/>
-              <a:t>RESULTADOS</a:t>
-            </a:r>
-            <a:endParaRPr/>
-          </a:p>
-        </p:txBody>
-      </p:sp>
-      <p:sp>
-        <p:nvSpPr>
-          <p:cNvPr id="190" name="Google Shape;190;g104ffd182bf_0_43"/>
-          <p:cNvSpPr txBox="1"/>
-          <p:nvPr/>
-        </p:nvSpPr>
-        <p:spPr>
-          <a:xfrm>
-            <a:off x="1199250" y="1056000"/>
-            <a:ext cx="9793500" cy="492600"/>
-          </a:xfrm>
-          <a:prstGeom prst="rect">
-            <a:avLst/>
-          </a:prstGeom>
-          <a:noFill/>
-          <a:ln>
-            <a:noFill/>
-          </a:ln>
-        </p:spPr>
-        <p:txBody>
-          <a:bodyPr anchorCtr="0" anchor="t" bIns="91425" lIns="91425" spcFirstLastPara="1" rIns="91425" wrap="square" tIns="91425">
-            <a:spAutoFit/>
-          </a:bodyPr>
-          <a:lstStyle/>
-          <a:p>
-            <a:pPr indent="0" lvl="0" marL="0" rtl="0" algn="ctr">
-              <a:spcBef>
-                <a:spcPts val="0"/>
-              </a:spcBef>
-              <a:spcAft>
-                <a:spcPts val="0"/>
-              </a:spcAft>
-              <a:buNone/>
-            </a:pPr>
-            <a:r>
-              <a:rPr lang="es-CO" sz="2000">
-                <a:latin typeface="Rockwell"/>
-                <a:ea typeface="Rockwell"/>
-                <a:cs typeface="Rockwell"/>
-                <a:sym typeface="Rockwell"/>
-              </a:rPr>
-              <a:t>Análisis de sensibilidad parámetro h  [-0.5, -0.8 -0.1 -1.2 -1.5].</a:t>
-            </a:r>
-            <a:endParaRPr sz="2000">
-              <a:latin typeface="Rockwell"/>
-              <a:ea typeface="Rockwell"/>
-              <a:cs typeface="Rockwell"/>
-              <a:sym typeface="Rockwell"/>
-            </a:endParaRPr>
-          </a:p>
-        </p:txBody>
-      </p:sp>
-      <p:sp>
-        <p:nvSpPr>
-          <p:cNvPr id="191" name="Google Shape;191;g104ffd182bf_0_43"/>
-          <p:cNvSpPr txBox="1"/>
-          <p:nvPr/>
-        </p:nvSpPr>
-        <p:spPr>
-          <a:xfrm>
-            <a:off x="872350" y="1752025"/>
-            <a:ext cx="4251000" cy="400200"/>
-          </a:xfrm>
-          <a:prstGeom prst="rect">
-            <a:avLst/>
-          </a:prstGeom>
-          <a:noFill/>
-          <a:ln cap="flat" cmpd="sng" w="9525">
-            <a:solidFill>
-              <a:srgbClr val="FF0000"/>
-            </a:solidFill>
-            <a:prstDash val="solid"/>
-            <a:round/>
-            <a:headEnd len="sm" w="sm" type="none"/>
-            <a:tailEnd len="sm" w="sm" type="none"/>
-          </a:ln>
-        </p:spPr>
-        <p:txBody>
-          <a:bodyPr anchorCtr="0" anchor="t" bIns="91425" lIns="91425" spcFirstLastPara="1" rIns="91425" wrap="square" tIns="91425">
-            <a:spAutoFit/>
-          </a:bodyPr>
-          <a:lstStyle/>
-          <a:p>
-            <a:pPr indent="0" lvl="0" marL="0" rtl="0" algn="ctr">
-              <a:spcBef>
-                <a:spcPts val="0"/>
-              </a:spcBef>
-              <a:spcAft>
-                <a:spcPts val="0"/>
-              </a:spcAft>
-              <a:buNone/>
-            </a:pPr>
-            <a:r>
-              <a:rPr lang="es-CO">
-                <a:solidFill>
-                  <a:srgbClr val="FF0000"/>
-                </a:solidFill>
-                <a:latin typeface="Rockwell"/>
-                <a:ea typeface="Rockwell"/>
-                <a:cs typeface="Rockwell"/>
-                <a:sym typeface="Rockwell"/>
-              </a:rPr>
-              <a:t>Modelo Newtoniano</a:t>
-            </a:r>
-            <a:r>
-              <a:rPr lang="es-CO">
-                <a:latin typeface="Rockwell"/>
-                <a:ea typeface="Rockwell"/>
-                <a:cs typeface="Rockwell"/>
-                <a:sym typeface="Rockwell"/>
-              </a:rPr>
-              <a:t> </a:t>
-            </a:r>
-            <a:endParaRPr>
-              <a:latin typeface="Rockwell"/>
-              <a:ea typeface="Rockwell"/>
-              <a:cs typeface="Rockwell"/>
-              <a:sym typeface="Rockwell"/>
-            </a:endParaRPr>
-          </a:p>
-        </p:txBody>
-      </p:sp>
-      <p:sp>
-        <p:nvSpPr>
-          <p:cNvPr id="192" name="Google Shape;192;g104ffd182bf_0_43"/>
-          <p:cNvSpPr txBox="1"/>
-          <p:nvPr/>
-        </p:nvSpPr>
-        <p:spPr>
-          <a:xfrm>
-            <a:off x="7068650" y="1752125"/>
-            <a:ext cx="4251000" cy="400200"/>
-          </a:xfrm>
-          <a:prstGeom prst="rect">
-            <a:avLst/>
-          </a:prstGeom>
-          <a:noFill/>
-          <a:ln cap="flat" cmpd="sng" w="9525">
-            <a:solidFill>
-              <a:srgbClr val="0000FF"/>
-            </a:solidFill>
-            <a:prstDash val="solid"/>
-            <a:round/>
-            <a:headEnd len="sm" w="sm" type="none"/>
-            <a:tailEnd len="sm" w="sm" type="none"/>
-          </a:ln>
-        </p:spPr>
-        <p:txBody>
-          <a:bodyPr anchorCtr="0" anchor="t" bIns="91425" lIns="91425" spcFirstLastPara="1" rIns="91425" wrap="square" tIns="91425">
-            <a:spAutoFit/>
-          </a:bodyPr>
-          <a:lstStyle/>
-          <a:p>
-            <a:pPr indent="0" lvl="0" marL="0" rtl="0" algn="ctr">
-              <a:spcBef>
-                <a:spcPts val="0"/>
-              </a:spcBef>
-              <a:spcAft>
-                <a:spcPts val="0"/>
-              </a:spcAft>
-              <a:buNone/>
-            </a:pPr>
-            <a:r>
-              <a:rPr lang="es-CO">
-                <a:solidFill>
-                  <a:srgbClr val="0000FF"/>
-                </a:solidFill>
-                <a:latin typeface="Rockwell"/>
-                <a:ea typeface="Rockwell"/>
-                <a:cs typeface="Rockwell"/>
-                <a:sym typeface="Rockwell"/>
-              </a:rPr>
-              <a:t>Modelo Relativista </a:t>
-            </a:r>
-            <a:endParaRPr>
-              <a:solidFill>
-                <a:srgbClr val="0000FF"/>
-              </a:solidFill>
-              <a:latin typeface="Rockwell"/>
-              <a:ea typeface="Rockwell"/>
-              <a:cs typeface="Rockwell"/>
-              <a:sym typeface="Rockwell"/>
-            </a:endParaRPr>
-          </a:p>
-        </p:txBody>
-      </p:sp>
-      <p:pic>
-        <p:nvPicPr>
-          <p:cNvPr id="193" name="Google Shape;193;g104ffd182bf_0_43"/>
-          <p:cNvPicPr preferRelativeResize="0"/>
-          <p:nvPr/>
-        </p:nvPicPr>
-        <p:blipFill>
-          <a:blip r:embed="rId3">
-            <a:alphaModFix/>
-          </a:blip>
-          <a:stretch>
-            <a:fillRect/>
-          </a:stretch>
-        </p:blipFill>
-        <p:spPr>
-          <a:xfrm>
-            <a:off x="0" y="2355650"/>
-            <a:ext cx="5976174" cy="3459624"/>
-          </a:xfrm>
-          <a:prstGeom prst="rect">
-            <a:avLst/>
-          </a:prstGeom>
-          <a:noFill/>
-          <a:ln>
-            <a:noFill/>
-          </a:ln>
-        </p:spPr>
-      </p:pic>
-      <p:pic>
-        <p:nvPicPr>
-          <p:cNvPr id="194" name="Google Shape;194;g104ffd182bf_0_43"/>
-          <p:cNvPicPr preferRelativeResize="0"/>
-          <p:nvPr/>
-        </p:nvPicPr>
-        <p:blipFill>
-          <a:blip r:embed="rId4">
-            <a:alphaModFix/>
-          </a:blip>
-          <a:stretch>
-            <a:fillRect/>
-          </a:stretch>
-        </p:blipFill>
-        <p:spPr>
-          <a:xfrm>
-            <a:off x="6137650" y="2355850"/>
-            <a:ext cx="6054350" cy="3459624"/>
-          </a:xfrm>
-          <a:prstGeom prst="rect">
-            <a:avLst/>
-          </a:prstGeom>
-          <a:noFill/>
-          <a:ln>
-            <a:noFill/>
-          </a:ln>
-        </p:spPr>
-      </p:pic>
-    </p:spTree>
-  </p:cSld>
-  <p:clrMapOvr>
-    <a:masterClrMapping/>
-  </p:clrMapOvr>
-</p:sld>
-</file>
-
-<file path=ppt/theme/theme1.xml><?xml version="1.0" encoding="utf-8"?>
+<file path=ppt/theme/theme2.xml><?xml version="1.0" encoding="utf-8"?>
 <a:theme xmlns:a="http://schemas.openxmlformats.org/drawingml/2006/main" xmlns:r="http://schemas.openxmlformats.org/officeDocument/2006/relationships" name="Letras en madera">
   <a:themeElements>
     <a:clrScheme name="Letras en madera">
@@ -20574,283 +21891,4 @@
     </a:fmtScheme>
   </a:themeElements>
 </a:theme>
-</file>
-
-<file path=ppt/theme/theme2.xml><?xml version="1.0" encoding="utf-8"?>
-<a:theme xmlns:a="http://schemas.openxmlformats.org/drawingml/2006/main" xmlns:r="http://schemas.openxmlformats.org/officeDocument/2006/relationships">
-  <a:themeElements>
-    <a:clrScheme name="Default">
-      <a:dk1>
-        <a:srgbClr val="000000"/>
-      </a:dk1>
-      <a:lt1>
-        <a:srgbClr val="FFFFFF"/>
-      </a:lt1>
-      <a:dk2>
-        <a:srgbClr val="158158"/>
-      </a:dk2>
-      <a:lt2>
-        <a:srgbClr val="F3F3F3"/>
-      </a:lt2>
-      <a:accent1>
-        <a:srgbClr val="058DC7"/>
-      </a:accent1>
-      <a:accent2>
-        <a:srgbClr val="50B432"/>
-      </a:accent2>
-      <a:accent3>
-        <a:srgbClr val="ED561B"/>
-      </a:accent3>
-      <a:accent4>
-        <a:srgbClr val="EDEF00"/>
-      </a:accent4>
-      <a:accent5>
-        <a:srgbClr val="24CBE5"/>
-      </a:accent5>
-      <a:accent6>
-        <a:srgbClr val="64E572"/>
-      </a:accent6>
-      <a:hlink>
-        <a:srgbClr val="2200CC"/>
-      </a:hlink>
-      <a:folHlink>
-        <a:srgbClr val="551A8B"/>
-      </a:folHlink>
-    </a:clrScheme>
-    <a:fontScheme name="Office">
-      <a:majorFont>
-        <a:latin typeface="Arial"/>
-        <a:ea typeface=""/>
-        <a:cs typeface=""/>
-        <a:font script="Jpan" typeface="ＭＳ Ｐゴシック"/>
-        <a:font script="Hang" typeface="맑은 고딕"/>
-        <a:font script="Hans" typeface="宋体"/>
-        <a:font script="Hant" typeface="新細明體"/>
-        <a:font script="Arab" typeface="Times New Roman"/>
-        <a:font script="Hebr" typeface="Times New Roman"/>
-        <a:font script="Thai" typeface="Angsana New"/>
-        <a:font script="Ethi" typeface="Nyala"/>
-        <a:font script="Beng" typeface="Vrinda"/>
-        <a:font script="Gujr" typeface="Shruti"/>
-        <a:font script="Khmr" typeface="MoolBoran"/>
-        <a:font script="Knda" typeface="Tunga"/>
-        <a:font script="Guru" typeface="Raavi"/>
-        <a:font script="Cans" typeface="Euphemia"/>
-        <a:font script="Cher" typeface="Plantagenet Cherokee"/>
-        <a:font script="Yiii" typeface="Microsoft Yi Baiti"/>
-        <a:font script="Tibt" typeface="Microsoft Himalaya"/>
-        <a:font script="Thaa" typeface="MV Boli"/>
-        <a:font script="Deva" typeface="Mangal"/>
-        <a:font script="Telu" typeface="Gautami"/>
-        <a:font script="Taml" typeface="Latha"/>
-        <a:font script="Syrc" typeface="Estrangelo Edessa"/>
-        <a:font script="Orya" typeface="Kalinga"/>
-        <a:font script="Mlym" typeface="Kartika"/>
-        <a:font script="Laoo" typeface="DokChampa"/>
-        <a:font script="Sinh" typeface="Iskoola Pota"/>
-        <a:font script="Mong" typeface="Mongolian Baiti"/>
-        <a:font script="Viet" typeface="Times New Roman"/>
-        <a:font script="Uigh" typeface="Microsoft Uighur"/>
-        <a:font script="Geor" typeface="Sylfaen"/>
-      </a:majorFont>
-      <a:minorFont>
-        <a:latin typeface="Arial"/>
-        <a:ea typeface=""/>
-        <a:cs typeface=""/>
-        <a:font script="Jpan" typeface="ＭＳ Ｐゴシック"/>
-        <a:font script="Hang" typeface="맑은 고딕"/>
-        <a:font script="Hans" typeface="宋体"/>
-        <a:font script="Hant" typeface="新細明體"/>
-        <a:font script="Arab" typeface="Arial"/>
-        <a:font script="Hebr" typeface="Arial"/>
-        <a:font script="Thai" typeface="Cordia New"/>
-        <a:font script="Ethi" typeface="Nyala"/>
-        <a:font script="Beng" typeface="Vrinda"/>
-        <a:font script="Gujr" typeface="Shruti"/>
-        <a:font script="Khmr" typeface="DaunPenh"/>
-        <a:font script="Knda" typeface="Tunga"/>
-        <a:font script="Guru" typeface="Raavi"/>
-        <a:font script="Cans" typeface="Euphemia"/>
-        <a:font script="Cher" typeface="Plantagenet Cherokee"/>
-        <a:font script="Yiii" typeface="Microsoft Yi Baiti"/>
-        <a:font script="Tibt" typeface="Microsoft Himalaya"/>
-        <a:font script="Thaa" typeface="MV Boli"/>
-        <a:font script="Deva" typeface="Mangal"/>
-        <a:font script="Telu" typeface="Gautami"/>
-        <a:font script="Taml" typeface="Latha"/>
-        <a:font script="Syrc" typeface="Estrangelo Edessa"/>
-        <a:font script="Orya" typeface="Kalinga"/>
-        <a:font script="Mlym" typeface="Kartika"/>
-        <a:font script="Laoo" typeface="DokChampa"/>
-        <a:font script="Sinh" typeface="Iskoola Pota"/>
-        <a:font script="Mong" typeface="Mongolian Baiti"/>
-        <a:font script="Viet" typeface="Arial"/>
-        <a:font script="Uigh" typeface="Microsoft Uighur"/>
-        <a:font script="Geor" typeface="Sylfaen"/>
-      </a:minorFont>
-    </a:fontScheme>
-    <a:fmtScheme name="Office">
-      <a:fillStyleLst>
-        <a:solidFill>
-          <a:schemeClr val="phClr"/>
-        </a:solidFill>
-        <a:gradFill rotWithShape="1">
-          <a:gsLst>
-            <a:gs pos="0">
-              <a:schemeClr val="phClr">
-                <a:tint val="50000"/>
-                <a:satMod val="300000"/>
-              </a:schemeClr>
-            </a:gs>
-            <a:gs pos="35000">
-              <a:schemeClr val="phClr">
-                <a:tint val="37000"/>
-                <a:satMod val="300000"/>
-              </a:schemeClr>
-            </a:gs>
-            <a:gs pos="100000">
-              <a:schemeClr val="phClr">
-                <a:tint val="15000"/>
-                <a:satMod val="350000"/>
-              </a:schemeClr>
-            </a:gs>
-          </a:gsLst>
-          <a:lin ang="16200000" scaled="1"/>
-        </a:gradFill>
-        <a:gradFill rotWithShape="1">
-          <a:gsLst>
-            <a:gs pos="0">
-              <a:schemeClr val="phClr">
-                <a:tint val="100000"/>
-                <a:shade val="100000"/>
-                <a:satMod val="130000"/>
-              </a:schemeClr>
-            </a:gs>
-            <a:gs pos="100000">
-              <a:schemeClr val="phClr">
-                <a:tint val="50000"/>
-                <a:shade val="100000"/>
-                <a:satMod val="350000"/>
-              </a:schemeClr>
-            </a:gs>
-          </a:gsLst>
-          <a:lin ang="16200000" scaled="0"/>
-        </a:gradFill>
-      </a:fillStyleLst>
-      <a:lnStyleLst>
-        <a:ln w="9525" cap="flat" cmpd="sng" algn="ctr">
-          <a:solidFill>
-            <a:schemeClr val="phClr">
-              <a:shade val="95000"/>
-              <a:satMod val="105000"/>
-            </a:schemeClr>
-          </a:solidFill>
-          <a:prstDash val="solid"/>
-        </a:ln>
-        <a:ln w="25400" cap="flat" cmpd="sng" algn="ctr">
-          <a:solidFill>
-            <a:schemeClr val="phClr"/>
-          </a:solidFill>
-          <a:prstDash val="solid"/>
-        </a:ln>
-        <a:ln w="38100" cap="flat" cmpd="sng" algn="ctr">
-          <a:solidFill>
-            <a:schemeClr val="phClr"/>
-          </a:solidFill>
-          <a:prstDash val="solid"/>
-        </a:ln>
-      </a:lnStyleLst>
-      <a:effectStyleLst>
-        <a:effectStyle>
-          <a:effectLst>
-            <a:outerShdw blurRad="40000" dist="20000" dir="5400000" rotWithShape="0">
-              <a:srgbClr val="000000">
-                <a:alpha val="38000"/>
-              </a:srgbClr>
-            </a:outerShdw>
-          </a:effectLst>
-        </a:effectStyle>
-        <a:effectStyle>
-          <a:effectLst>
-            <a:outerShdw blurRad="40000" dist="23000" dir="5400000" rotWithShape="0">
-              <a:srgbClr val="000000">
-                <a:alpha val="35000"/>
-              </a:srgbClr>
-            </a:outerShdw>
-          </a:effectLst>
-        </a:effectStyle>
-        <a:effectStyle>
-          <a:effectLst>
-            <a:outerShdw blurRad="40000" dist="23000" dir="5400000" rotWithShape="0">
-              <a:srgbClr val="000000">
-                <a:alpha val="35000"/>
-              </a:srgbClr>
-            </a:outerShdw>
-          </a:effectLst>
-          <a:scene3d>
-            <a:camera prst="orthographicFront">
-              <a:rot lat="0" lon="0" rev="0"/>
-            </a:camera>
-            <a:lightRig rig="threePt" dir="t">
-              <a:rot lat="0" lon="0" rev="1200000"/>
-            </a:lightRig>
-          </a:scene3d>
-          <a:sp3d>
-            <a:bevelT w="63500" h="25400"/>
-          </a:sp3d>
-        </a:effectStyle>
-      </a:effectStyleLst>
-      <a:bgFillStyleLst>
-        <a:solidFill>
-          <a:schemeClr val="phClr"/>
-        </a:solidFill>
-        <a:gradFill rotWithShape="1">
-          <a:gsLst>
-            <a:gs pos="0">
-              <a:schemeClr val="phClr">
-                <a:tint val="40000"/>
-                <a:satMod val="350000"/>
-              </a:schemeClr>
-            </a:gs>
-            <a:gs pos="40000">
-              <a:schemeClr val="phClr">
-                <a:tint val="45000"/>
-                <a:shade val="99000"/>
-                <a:satMod val="350000"/>
-              </a:schemeClr>
-            </a:gs>
-            <a:gs pos="100000">
-              <a:schemeClr val="phClr">
-                <a:shade val="20000"/>
-                <a:satMod val="255000"/>
-              </a:schemeClr>
-            </a:gs>
-          </a:gsLst>
-          <a:path path="circle">
-            <a:fillToRect l="50000" t="-80000" r="50000" b="180000"/>
-          </a:path>
-        </a:gradFill>
-        <a:gradFill rotWithShape="1">
-          <a:gsLst>
-            <a:gs pos="0">
-              <a:schemeClr val="phClr">
-                <a:tint val="80000"/>
-                <a:satMod val="300000"/>
-              </a:schemeClr>
-            </a:gs>
-            <a:gs pos="100000">
-              <a:schemeClr val="phClr">
-                <a:shade val="30000"/>
-                <a:satMod val="200000"/>
-              </a:schemeClr>
-            </a:gs>
-          </a:gsLst>
-          <a:path path="circle">
-            <a:fillToRect l="50000" t="50000" r="50000" b="50000"/>
-          </a:path>
-        </a:gradFill>
-      </a:bgFillStyleLst>
-    </a:fmtScheme>
-  </a:themeElements>
-</a:theme>
 </file>
</xml_diff>